<commit_message>
Added new guideset figure
</commit_message>
<xml_diff>
--- a/figures/guideset/guideset.pptx
+++ b/figures/guideset/guideset.pptx
@@ -2,7 +2,7 @@
 <file path=ppt/presentation.xml><?xml version="1.0" encoding="utf-8"?>
 <p:presentation xmlns:a="http://schemas.openxmlformats.org/drawingml/2006/main" xmlns:r="http://schemas.openxmlformats.org/officeDocument/2006/relationships" xmlns:p="http://schemas.openxmlformats.org/presentationml/2006/main" saveSubsetFonts="1" autoCompressPictures="0">
   <p:sldMasterIdLst>
-    <p:sldMasterId id="2147483960" r:id="rId1"/>
+    <p:sldMasterId id="2147483972" r:id="rId1"/>
   </p:sldMasterIdLst>
   <p:notesMasterIdLst>
     <p:notesMasterId r:id="rId3"/>
@@ -10,7 +10,7 @@
   <p:sldIdLst>
     <p:sldId id="261" r:id="rId2"/>
   </p:sldIdLst>
-  <p:sldSz cx="9783763" cy="12069763"/>
+  <p:sldSz cx="9783763" cy="12436475"/>
   <p:notesSz cx="6858000" cy="9144000"/>
   <p:defaultTextStyle>
     <a:defPPr>
@@ -197,7 +197,7 @@
           <a:p>
             <a:fld id="{EA340EF4-FADB-364B-91FA-18633379C075}" type="datetimeFigureOut">
               <a:rPr lang="en-US" smtClean="0"/>
-              <a:t>3/11/22</a:t>
+              <a:t>4/20/22</a:t>
             </a:fld>
             <a:endParaRPr lang="en-US"/>
           </a:p>
@@ -215,8 +215,8 @@
         </p:nvSpPr>
         <p:spPr>
           <a:xfrm>
-            <a:off x="2179638" y="1143000"/>
-            <a:ext cx="2498725" cy="3086100"/>
+            <a:off x="2214563" y="1143000"/>
+            <a:ext cx="2428875" cy="3086100"/>
           </a:xfrm>
           <a:prstGeom prst="rect">
             <a:avLst/>
@@ -493,8 +493,8 @@
         </p:nvSpPr>
         <p:spPr>
           <a:xfrm>
-            <a:off x="2179638" y="1143000"/>
-            <a:ext cx="2498725" cy="3086100"/>
+            <a:off x="2214563" y="1143000"/>
+            <a:ext cx="2428875" cy="3086100"/>
           </a:xfrm>
         </p:spPr>
       </p:sp>
@@ -582,8 +582,8 @@
         </p:nvSpPr>
         <p:spPr>
           <a:xfrm>
-            <a:off x="733782" y="1975307"/>
-            <a:ext cx="8316199" cy="4202066"/>
+            <a:off x="733782" y="2035322"/>
+            <a:ext cx="8316199" cy="4329736"/>
           </a:xfrm>
         </p:spPr>
         <p:txBody>
@@ -614,8 +614,8 @@
         </p:nvSpPr>
         <p:spPr>
           <a:xfrm>
-            <a:off x="1222971" y="6339420"/>
-            <a:ext cx="7337822" cy="2914065"/>
+            <a:off x="1222971" y="6532029"/>
+            <a:ext cx="7337822" cy="3002602"/>
           </a:xfrm>
         </p:spPr>
         <p:txBody>
@@ -684,7 +684,7 @@
           <a:p>
             <a:fld id="{DD6D9246-4FED-8E4D-BC9B-CDD794F2A5B7}" type="datetimeFigureOut">
               <a:rPr lang="en-US" smtClean="0"/>
-              <a:t>3/11/22</a:t>
+              <a:t>4/20/22</a:t>
             </a:fld>
             <a:endParaRPr lang="en-US"/>
           </a:p>
@@ -735,7 +735,7 @@
     </p:spTree>
     <p:extLst>
       <p:ext uri="{BB962C8B-B14F-4D97-AF65-F5344CB8AC3E}">
-        <p14:creationId xmlns:p14="http://schemas.microsoft.com/office/powerpoint/2010/main" val="3490811738"/>
+        <p14:creationId xmlns:p14="http://schemas.microsoft.com/office/powerpoint/2010/main" val="2892736988"/>
       </p:ext>
     </p:extLst>
   </p:cSld>
@@ -854,7 +854,7 @@
           <a:p>
             <a:fld id="{DD6D9246-4FED-8E4D-BC9B-CDD794F2A5B7}" type="datetimeFigureOut">
               <a:rPr lang="en-US" smtClean="0"/>
-              <a:t>3/11/22</a:t>
+              <a:t>4/20/22</a:t>
             </a:fld>
             <a:endParaRPr lang="en-US"/>
           </a:p>
@@ -905,7 +905,7 @@
     </p:spTree>
     <p:extLst>
       <p:ext uri="{BB962C8B-B14F-4D97-AF65-F5344CB8AC3E}">
-        <p14:creationId xmlns:p14="http://schemas.microsoft.com/office/powerpoint/2010/main" val="1606007776"/>
+        <p14:creationId xmlns:p14="http://schemas.microsoft.com/office/powerpoint/2010/main" val="2163833218"/>
       </p:ext>
     </p:extLst>
   </p:cSld>
@@ -944,8 +944,8 @@
         </p:nvSpPr>
         <p:spPr>
           <a:xfrm>
-            <a:off x="7001506" y="642603"/>
-            <a:ext cx="2109624" cy="10228566"/>
+            <a:off x="7001506" y="662127"/>
+            <a:ext cx="2109624" cy="10539338"/>
           </a:xfrm>
         </p:spPr>
         <p:txBody>
@@ -972,8 +972,8 @@
         </p:nvSpPr>
         <p:spPr>
           <a:xfrm>
-            <a:off x="672634" y="642603"/>
-            <a:ext cx="6206575" cy="10228566"/>
+            <a:off x="672634" y="662127"/>
+            <a:ext cx="6206575" cy="10539338"/>
           </a:xfrm>
         </p:spPr>
         <p:txBody>
@@ -1034,7 +1034,7 @@
           <a:p>
             <a:fld id="{DD6D9246-4FED-8E4D-BC9B-CDD794F2A5B7}" type="datetimeFigureOut">
               <a:rPr lang="en-US" smtClean="0"/>
-              <a:t>3/11/22</a:t>
+              <a:t>4/20/22</a:t>
             </a:fld>
             <a:endParaRPr lang="en-US"/>
           </a:p>
@@ -1085,7 +1085,7 @@
     </p:spTree>
     <p:extLst>
       <p:ext uri="{BB962C8B-B14F-4D97-AF65-F5344CB8AC3E}">
-        <p14:creationId xmlns:p14="http://schemas.microsoft.com/office/powerpoint/2010/main" val="3808897814"/>
+        <p14:creationId xmlns:p14="http://schemas.microsoft.com/office/powerpoint/2010/main" val="4152191529"/>
       </p:ext>
     </p:extLst>
   </p:cSld>
@@ -1204,7 +1204,7 @@
           <a:p>
             <a:fld id="{DD6D9246-4FED-8E4D-BC9B-CDD794F2A5B7}" type="datetimeFigureOut">
               <a:rPr lang="en-US" smtClean="0"/>
-              <a:t>3/11/22</a:t>
+              <a:t>4/20/22</a:t>
             </a:fld>
             <a:endParaRPr lang="en-US"/>
           </a:p>
@@ -1255,7 +1255,7 @@
     </p:spTree>
     <p:extLst>
       <p:ext uri="{BB962C8B-B14F-4D97-AF65-F5344CB8AC3E}">
-        <p14:creationId xmlns:p14="http://schemas.microsoft.com/office/powerpoint/2010/main" val="2841238705"/>
+        <p14:creationId xmlns:p14="http://schemas.microsoft.com/office/powerpoint/2010/main" val="1293833566"/>
       </p:ext>
     </p:extLst>
   </p:cSld>
@@ -1294,8 +1294,8 @@
         </p:nvSpPr>
         <p:spPr>
           <a:xfrm>
-            <a:off x="667538" y="3009063"/>
-            <a:ext cx="8438496" cy="5020685"/>
+            <a:off x="667538" y="3100486"/>
+            <a:ext cx="8438496" cy="5173227"/>
           </a:xfrm>
         </p:spPr>
         <p:txBody>
@@ -1326,8 +1326,8 @@
         </p:nvSpPr>
         <p:spPr>
           <a:xfrm>
-            <a:off x="667538" y="8077245"/>
-            <a:ext cx="8438496" cy="2640260"/>
+            <a:off x="667538" y="8322654"/>
+            <a:ext cx="8438496" cy="2720478"/>
           </a:xfrm>
         </p:spPr>
         <p:txBody>
@@ -1448,7 +1448,7 @@
           <a:p>
             <a:fld id="{DD6D9246-4FED-8E4D-BC9B-CDD794F2A5B7}" type="datetimeFigureOut">
               <a:rPr lang="en-US" smtClean="0"/>
-              <a:t>3/11/22</a:t>
+              <a:t>4/20/22</a:t>
             </a:fld>
             <a:endParaRPr lang="en-US"/>
           </a:p>
@@ -1499,7 +1499,7 @@
     </p:spTree>
     <p:extLst>
       <p:ext uri="{BB962C8B-B14F-4D97-AF65-F5344CB8AC3E}">
-        <p14:creationId xmlns:p14="http://schemas.microsoft.com/office/powerpoint/2010/main" val="1608569365"/>
+        <p14:creationId xmlns:p14="http://schemas.microsoft.com/office/powerpoint/2010/main" val="2324837424"/>
       </p:ext>
     </p:extLst>
   </p:cSld>
@@ -1561,8 +1561,8 @@
         </p:nvSpPr>
         <p:spPr>
           <a:xfrm>
-            <a:off x="672634" y="3213015"/>
-            <a:ext cx="4158099" cy="7658154"/>
+            <a:off x="672634" y="3310636"/>
+            <a:ext cx="4158099" cy="7890829"/>
           </a:xfrm>
         </p:spPr>
         <p:txBody>
@@ -1618,8 +1618,8 @@
         </p:nvSpPr>
         <p:spPr>
           <a:xfrm>
-            <a:off x="4953030" y="3213015"/>
-            <a:ext cx="4158099" cy="7658154"/>
+            <a:off x="4953030" y="3310636"/>
+            <a:ext cx="4158099" cy="7890829"/>
           </a:xfrm>
         </p:spPr>
         <p:txBody>
@@ -1680,7 +1680,7 @@
           <a:p>
             <a:fld id="{DD6D9246-4FED-8E4D-BC9B-CDD794F2A5B7}" type="datetimeFigureOut">
               <a:rPr lang="en-US" smtClean="0"/>
-              <a:t>3/11/22</a:t>
+              <a:t>4/20/22</a:t>
             </a:fld>
             <a:endParaRPr lang="en-US"/>
           </a:p>
@@ -1731,7 +1731,7 @@
     </p:spTree>
     <p:extLst>
       <p:ext uri="{BB962C8B-B14F-4D97-AF65-F5344CB8AC3E}">
-        <p14:creationId xmlns:p14="http://schemas.microsoft.com/office/powerpoint/2010/main" val="1257657046"/>
+        <p14:creationId xmlns:p14="http://schemas.microsoft.com/office/powerpoint/2010/main" val="1985282850"/>
       </p:ext>
     </p:extLst>
   </p:cSld>
@@ -1770,8 +1770,8 @@
         </p:nvSpPr>
         <p:spPr>
           <a:xfrm>
-            <a:off x="673908" y="642606"/>
-            <a:ext cx="8438496" cy="2332930"/>
+            <a:off x="673908" y="662130"/>
+            <a:ext cx="8438496" cy="2403810"/>
           </a:xfrm>
         </p:spPr>
         <p:txBody>
@@ -1798,8 +1798,8 @@
         </p:nvSpPr>
         <p:spPr>
           <a:xfrm>
-            <a:off x="673909" y="2958769"/>
-            <a:ext cx="4138990" cy="1450047"/>
+            <a:off x="673909" y="3048665"/>
+            <a:ext cx="4138990" cy="1494103"/>
           </a:xfrm>
         </p:spPr>
         <p:txBody>
@@ -1863,8 +1863,8 @@
         </p:nvSpPr>
         <p:spPr>
           <a:xfrm>
-            <a:off x="673909" y="4408816"/>
-            <a:ext cx="4138990" cy="6484705"/>
+            <a:off x="673909" y="4542768"/>
+            <a:ext cx="4138990" cy="6681727"/>
           </a:xfrm>
         </p:spPr>
         <p:txBody>
@@ -1920,8 +1920,8 @@
         </p:nvSpPr>
         <p:spPr>
           <a:xfrm>
-            <a:off x="4953030" y="2958769"/>
-            <a:ext cx="4159374" cy="1450047"/>
+            <a:off x="4953030" y="3048665"/>
+            <a:ext cx="4159374" cy="1494103"/>
           </a:xfrm>
         </p:spPr>
         <p:txBody>
@@ -1985,8 +1985,8 @@
         </p:nvSpPr>
         <p:spPr>
           <a:xfrm>
-            <a:off x="4953030" y="4408816"/>
-            <a:ext cx="4159374" cy="6484705"/>
+            <a:off x="4953030" y="4542768"/>
+            <a:ext cx="4159374" cy="6681727"/>
           </a:xfrm>
         </p:spPr>
         <p:txBody>
@@ -2047,7 +2047,7 @@
           <a:p>
             <a:fld id="{DD6D9246-4FED-8E4D-BC9B-CDD794F2A5B7}" type="datetimeFigureOut">
               <a:rPr lang="en-US" smtClean="0"/>
-              <a:t>3/11/22</a:t>
+              <a:t>4/20/22</a:t>
             </a:fld>
             <a:endParaRPr lang="en-US"/>
           </a:p>
@@ -2098,7 +2098,7 @@
     </p:spTree>
     <p:extLst>
       <p:ext uri="{BB962C8B-B14F-4D97-AF65-F5344CB8AC3E}">
-        <p14:creationId xmlns:p14="http://schemas.microsoft.com/office/powerpoint/2010/main" val="2621218246"/>
+        <p14:creationId xmlns:p14="http://schemas.microsoft.com/office/powerpoint/2010/main" val="2188057059"/>
       </p:ext>
     </p:extLst>
   </p:cSld>
@@ -2165,7 +2165,7 @@
           <a:p>
             <a:fld id="{DD6D9246-4FED-8E4D-BC9B-CDD794F2A5B7}" type="datetimeFigureOut">
               <a:rPr lang="en-US" smtClean="0"/>
-              <a:t>3/11/22</a:t>
+              <a:t>4/20/22</a:t>
             </a:fld>
             <a:endParaRPr lang="en-US"/>
           </a:p>
@@ -2216,7 +2216,7 @@
     </p:spTree>
     <p:extLst>
       <p:ext uri="{BB962C8B-B14F-4D97-AF65-F5344CB8AC3E}">
-        <p14:creationId xmlns:p14="http://schemas.microsoft.com/office/powerpoint/2010/main" val="2983066934"/>
+        <p14:creationId xmlns:p14="http://schemas.microsoft.com/office/powerpoint/2010/main" val="2744603372"/>
       </p:ext>
     </p:extLst>
   </p:cSld>
@@ -2260,7 +2260,7 @@
           <a:p>
             <a:fld id="{DD6D9246-4FED-8E4D-BC9B-CDD794F2A5B7}" type="datetimeFigureOut">
               <a:rPr lang="en-US" smtClean="0"/>
-              <a:t>3/11/22</a:t>
+              <a:t>4/20/22</a:t>
             </a:fld>
             <a:endParaRPr lang="en-US"/>
           </a:p>
@@ -2311,7 +2311,7 @@
     </p:spTree>
     <p:extLst>
       <p:ext uri="{BB962C8B-B14F-4D97-AF65-F5344CB8AC3E}">
-        <p14:creationId xmlns:p14="http://schemas.microsoft.com/office/powerpoint/2010/main" val="3373993539"/>
+        <p14:creationId xmlns:p14="http://schemas.microsoft.com/office/powerpoint/2010/main" val="1019757826"/>
       </p:ext>
     </p:extLst>
   </p:cSld>
@@ -2350,8 +2350,8 @@
         </p:nvSpPr>
         <p:spPr>
           <a:xfrm>
-            <a:off x="673908" y="804651"/>
-            <a:ext cx="3155518" cy="2816278"/>
+            <a:off x="673908" y="829098"/>
+            <a:ext cx="3155518" cy="2901844"/>
           </a:xfrm>
         </p:spPr>
         <p:txBody>
@@ -2382,8 +2382,8 @@
         </p:nvSpPr>
         <p:spPr>
           <a:xfrm>
-            <a:off x="4159374" y="1737825"/>
-            <a:ext cx="4953030" cy="8577355"/>
+            <a:off x="4159374" y="1790625"/>
+            <a:ext cx="4953030" cy="8837958"/>
           </a:xfrm>
         </p:spPr>
         <p:txBody>
@@ -2467,8 +2467,8 @@
         </p:nvSpPr>
         <p:spPr>
           <a:xfrm>
-            <a:off x="673908" y="3620929"/>
-            <a:ext cx="3155518" cy="6708219"/>
+            <a:off x="673908" y="3730943"/>
+            <a:ext cx="3155518" cy="6912032"/>
           </a:xfrm>
         </p:spPr>
         <p:txBody>
@@ -2537,7 +2537,7 @@
           <a:p>
             <a:fld id="{DD6D9246-4FED-8E4D-BC9B-CDD794F2A5B7}" type="datetimeFigureOut">
               <a:rPr lang="en-US" smtClean="0"/>
-              <a:t>3/11/22</a:t>
+              <a:t>4/20/22</a:t>
             </a:fld>
             <a:endParaRPr lang="en-US"/>
           </a:p>
@@ -2588,7 +2588,7 @@
     </p:spTree>
     <p:extLst>
       <p:ext uri="{BB962C8B-B14F-4D97-AF65-F5344CB8AC3E}">
-        <p14:creationId xmlns:p14="http://schemas.microsoft.com/office/powerpoint/2010/main" val="2858641280"/>
+        <p14:creationId xmlns:p14="http://schemas.microsoft.com/office/powerpoint/2010/main" val="2053591043"/>
       </p:ext>
     </p:extLst>
   </p:cSld>
@@ -2627,8 +2627,8 @@
         </p:nvSpPr>
         <p:spPr>
           <a:xfrm>
-            <a:off x="673908" y="804651"/>
-            <a:ext cx="3155518" cy="2816278"/>
+            <a:off x="673908" y="829098"/>
+            <a:ext cx="3155518" cy="2901844"/>
           </a:xfrm>
         </p:spPr>
         <p:txBody>
@@ -2659,8 +2659,8 @@
         </p:nvSpPr>
         <p:spPr>
           <a:xfrm>
-            <a:off x="4159374" y="1737825"/>
-            <a:ext cx="4953030" cy="8577355"/>
+            <a:off x="4159374" y="1790625"/>
+            <a:ext cx="4953030" cy="8837958"/>
           </a:xfrm>
         </p:spPr>
         <p:txBody>
@@ -2724,8 +2724,8 @@
         </p:nvSpPr>
         <p:spPr>
           <a:xfrm>
-            <a:off x="673908" y="3620929"/>
-            <a:ext cx="3155518" cy="6708219"/>
+            <a:off x="673908" y="3730943"/>
+            <a:ext cx="3155518" cy="6912032"/>
           </a:xfrm>
         </p:spPr>
         <p:txBody>
@@ -2794,7 +2794,7 @@
           <a:p>
             <a:fld id="{DD6D9246-4FED-8E4D-BC9B-CDD794F2A5B7}" type="datetimeFigureOut">
               <a:rPr lang="en-US" smtClean="0"/>
-              <a:t>3/11/22</a:t>
+              <a:t>4/20/22</a:t>
             </a:fld>
             <a:endParaRPr lang="en-US"/>
           </a:p>
@@ -2845,7 +2845,7 @@
     </p:spTree>
     <p:extLst>
       <p:ext uri="{BB962C8B-B14F-4D97-AF65-F5344CB8AC3E}">
-        <p14:creationId xmlns:p14="http://schemas.microsoft.com/office/powerpoint/2010/main" val="3865357456"/>
+        <p14:creationId xmlns:p14="http://schemas.microsoft.com/office/powerpoint/2010/main" val="2362641886"/>
       </p:ext>
     </p:extLst>
   </p:cSld>
@@ -2889,8 +2889,8 @@
         </p:nvSpPr>
         <p:spPr>
           <a:xfrm>
-            <a:off x="672634" y="642606"/>
-            <a:ext cx="8438496" cy="2332930"/>
+            <a:off x="672634" y="662130"/>
+            <a:ext cx="8438496" cy="2403810"/>
           </a:xfrm>
           <a:prstGeom prst="rect">
             <a:avLst/>
@@ -2922,8 +2922,8 @@
         </p:nvSpPr>
         <p:spPr>
           <a:xfrm>
-            <a:off x="672634" y="3213015"/>
-            <a:ext cx="8438496" cy="7658154"/>
+            <a:off x="672634" y="3310636"/>
+            <a:ext cx="8438496" cy="7890829"/>
           </a:xfrm>
           <a:prstGeom prst="rect">
             <a:avLst/>
@@ -2984,8 +2984,8 @@
         </p:nvSpPr>
         <p:spPr>
           <a:xfrm>
-            <a:off x="672634" y="11186885"/>
-            <a:ext cx="2201347" cy="642603"/>
+            <a:off x="672634" y="11526773"/>
+            <a:ext cx="2201347" cy="662127"/>
           </a:xfrm>
           <a:prstGeom prst="rect">
             <a:avLst/>
@@ -3007,7 +3007,7 @@
           <a:p>
             <a:fld id="{DD6D9246-4FED-8E4D-BC9B-CDD794F2A5B7}" type="datetimeFigureOut">
               <a:rPr lang="en-US" smtClean="0"/>
-              <a:t>3/11/22</a:t>
+              <a:t>4/20/22</a:t>
             </a:fld>
             <a:endParaRPr lang="en-US"/>
           </a:p>
@@ -3025,8 +3025,8 @@
         </p:nvSpPr>
         <p:spPr>
           <a:xfrm>
-            <a:off x="3240872" y="11186885"/>
-            <a:ext cx="3302020" cy="642603"/>
+            <a:off x="3240872" y="11526773"/>
+            <a:ext cx="3302020" cy="662127"/>
           </a:xfrm>
           <a:prstGeom prst="rect">
             <a:avLst/>
@@ -3062,8 +3062,8 @@
         </p:nvSpPr>
         <p:spPr>
           <a:xfrm>
-            <a:off x="6909782" y="11186885"/>
-            <a:ext cx="2201347" cy="642603"/>
+            <a:off x="6909782" y="11526773"/>
+            <a:ext cx="2201347" cy="662127"/>
           </a:xfrm>
           <a:prstGeom prst="rect">
             <a:avLst/>
@@ -3094,23 +3094,23 @@
     </p:spTree>
     <p:extLst>
       <p:ext uri="{BB962C8B-B14F-4D97-AF65-F5344CB8AC3E}">
-        <p14:creationId xmlns:p14="http://schemas.microsoft.com/office/powerpoint/2010/main" val="2311495144"/>
+        <p14:creationId xmlns:p14="http://schemas.microsoft.com/office/powerpoint/2010/main" val="3120839425"/>
       </p:ext>
     </p:extLst>
   </p:cSld>
   <p:clrMap bg1="lt1" tx1="dk1" bg2="lt2" tx2="dk2" accent1="accent1" accent2="accent2" accent3="accent3" accent4="accent4" accent5="accent5" accent6="accent6" hlink="hlink" folHlink="folHlink"/>
   <p:sldLayoutIdLst>
-    <p:sldLayoutId id="2147483961" r:id="rId1"/>
-    <p:sldLayoutId id="2147483962" r:id="rId2"/>
-    <p:sldLayoutId id="2147483963" r:id="rId3"/>
-    <p:sldLayoutId id="2147483964" r:id="rId4"/>
-    <p:sldLayoutId id="2147483965" r:id="rId5"/>
-    <p:sldLayoutId id="2147483966" r:id="rId6"/>
-    <p:sldLayoutId id="2147483967" r:id="rId7"/>
-    <p:sldLayoutId id="2147483968" r:id="rId8"/>
-    <p:sldLayoutId id="2147483969" r:id="rId9"/>
-    <p:sldLayoutId id="2147483970" r:id="rId10"/>
-    <p:sldLayoutId id="2147483971" r:id="rId11"/>
+    <p:sldLayoutId id="2147483973" r:id="rId1"/>
+    <p:sldLayoutId id="2147483974" r:id="rId2"/>
+    <p:sldLayoutId id="2147483975" r:id="rId3"/>
+    <p:sldLayoutId id="2147483976" r:id="rId4"/>
+    <p:sldLayoutId id="2147483977" r:id="rId5"/>
+    <p:sldLayoutId id="2147483978" r:id="rId6"/>
+    <p:sldLayoutId id="2147483979" r:id="rId7"/>
+    <p:sldLayoutId id="2147483980" r:id="rId8"/>
+    <p:sldLayoutId id="2147483981" r:id="rId9"/>
+    <p:sldLayoutId id="2147483982" r:id="rId10"/>
+    <p:sldLayoutId id="2147483983" r:id="rId11"/>
   </p:sldLayoutIdLst>
   <p:txStyles>
     <p:titleStyle>
@@ -3426,7 +3426,7 @@
         </p:nvSpPr>
         <p:spPr>
           <a:xfrm>
-            <a:off x="552570" y="7641873"/>
+            <a:off x="552570" y="7853348"/>
             <a:ext cx="9152262" cy="677940"/>
           </a:xfrm>
           <a:prstGeom prst="roundRect">
@@ -3480,7 +3480,7 @@
         </p:nvSpPr>
         <p:spPr>
           <a:xfrm>
-            <a:off x="552570" y="4055838"/>
+            <a:off x="552570" y="4267314"/>
             <a:ext cx="5430230" cy="427867"/>
           </a:xfrm>
           <a:prstGeom prst="roundRect">
@@ -3536,7 +3536,7 @@
         </p:nvSpPr>
         <p:spPr>
           <a:xfrm>
-            <a:off x="552577" y="5655838"/>
+            <a:off x="552578" y="5867314"/>
             <a:ext cx="8451141" cy="819975"/>
           </a:xfrm>
           <a:prstGeom prst="roundRect">
@@ -3590,14 +3590,14 @@
         </p:nvSpPr>
         <p:spPr>
           <a:xfrm>
-            <a:off x="7425722" y="444990"/>
+            <a:off x="7561448" y="853644"/>
             <a:ext cx="466182" cy="1247852"/>
           </a:xfrm>
           <a:prstGeom prst="roundRect">
             <a:avLst/>
           </a:prstGeom>
           <a:solidFill>
-            <a:srgbClr val="AADAB3"/>
+            <a:srgbClr val="C0F3CE"/>
           </a:solidFill>
           <a:ln>
             <a:solidFill>
@@ -3649,7 +3649,7 @@
         </p:nvSpPr>
         <p:spPr>
           <a:xfrm>
-            <a:off x="5283302" y="444990"/>
+            <a:off x="5283302" y="946391"/>
             <a:ext cx="574496" cy="1247852"/>
           </a:xfrm>
           <a:prstGeom prst="roundRect">
@@ -3692,10 +3692,10 @@
       </p:sp>
       <p:sp>
         <p:nvSpPr>
-          <p:cNvPr id="232" name="Rounded Rectangle 231">
-            <a:extLst>
-              <a:ext uri="{FF2B5EF4-FFF2-40B4-BE49-F238E27FC236}">
-                <a16:creationId xmlns:a16="http://schemas.microsoft.com/office/drawing/2014/main" id="{CF9B1944-F45F-4B40-A288-89078BC1F1C8}"/>
+          <p:cNvPr id="146" name="Rounded Rectangle 145">
+            <a:extLst>
+              <a:ext uri="{FF2B5EF4-FFF2-40B4-BE49-F238E27FC236}">
+                <a16:creationId xmlns:a16="http://schemas.microsoft.com/office/drawing/2014/main" id="{CC5B122B-18AF-CD47-BB74-F197AF50C377}"/>
               </a:ext>
             </a:extLst>
           </p:cNvPr>
@@ -3704,119 +3704,7 @@
         </p:nvSpPr>
         <p:spPr>
           <a:xfrm>
-            <a:off x="8775615" y="444990"/>
-            <a:ext cx="782885" cy="1247852"/>
-          </a:xfrm>
-          <a:prstGeom prst="roundRect">
-            <a:avLst/>
-          </a:prstGeom>
-          <a:solidFill>
-            <a:srgbClr val="ECF9E3">
-              <a:alpha val="83137"/>
-            </a:srgbClr>
-          </a:solidFill>
-          <a:ln>
-            <a:solidFill>
-              <a:schemeClr val="tx1"/>
-            </a:solidFill>
-            <a:prstDash val="solid"/>
-          </a:ln>
-        </p:spPr>
-        <p:style>
-          <a:lnRef idx="2">
-            <a:schemeClr val="accent1">
-              <a:shade val="50000"/>
-            </a:schemeClr>
-          </a:lnRef>
-          <a:fillRef idx="1">
-            <a:schemeClr val="accent1"/>
-          </a:fillRef>
-          <a:effectRef idx="0">
-            <a:schemeClr val="accent1"/>
-          </a:effectRef>
-          <a:fontRef idx="minor">
-            <a:schemeClr val="lt1"/>
-          </a:fontRef>
-        </p:style>
-        <p:txBody>
-          <a:bodyPr rtlCol="0" anchor="ctr"/>
-          <a:lstStyle/>
-          <a:p>
-            <a:pPr algn="ctr"/>
-            <a:endParaRPr lang="en-US"/>
-          </a:p>
-        </p:txBody>
-      </p:sp>
-      <p:sp>
-        <p:nvSpPr>
-          <p:cNvPr id="231" name="Rounded Rectangle 230">
-            <a:extLst>
-              <a:ext uri="{FF2B5EF4-FFF2-40B4-BE49-F238E27FC236}">
-                <a16:creationId xmlns:a16="http://schemas.microsoft.com/office/drawing/2014/main" id="{5061AAFC-31F2-9942-94C1-A830D4F3B152}"/>
-              </a:ext>
-            </a:extLst>
-          </p:cNvPr>
-          <p:cNvSpPr/>
-          <p:nvPr/>
-        </p:nvSpPr>
-        <p:spPr>
-          <a:xfrm>
-            <a:off x="7947925" y="444990"/>
-            <a:ext cx="782885" cy="1247852"/>
-          </a:xfrm>
-          <a:prstGeom prst="roundRect">
-            <a:avLst/>
-          </a:prstGeom>
-          <a:solidFill>
-            <a:srgbClr val="D3E8BB"/>
-          </a:solidFill>
-          <a:ln>
-            <a:solidFill>
-              <a:schemeClr val="tx1"/>
-            </a:solidFill>
-            <a:prstDash val="solid"/>
-          </a:ln>
-        </p:spPr>
-        <p:style>
-          <a:lnRef idx="2">
-            <a:schemeClr val="accent1">
-              <a:shade val="50000"/>
-            </a:schemeClr>
-          </a:lnRef>
-          <a:fillRef idx="1">
-            <a:schemeClr val="accent1"/>
-          </a:fillRef>
-          <a:effectRef idx="0">
-            <a:schemeClr val="accent1"/>
-          </a:effectRef>
-          <a:fontRef idx="minor">
-            <a:schemeClr val="lt1"/>
-          </a:fontRef>
-        </p:style>
-        <p:txBody>
-          <a:bodyPr rtlCol="0" anchor="ctr"/>
-          <a:lstStyle/>
-          <a:p>
-            <a:pPr algn="ctr"/>
-            <a:endParaRPr lang="en-US"/>
-          </a:p>
-        </p:txBody>
-      </p:sp>
-      <p:sp>
-        <p:nvSpPr>
-          <p:cNvPr id="146" name="Rounded Rectangle 145">
-            <a:extLst>
-              <a:ext uri="{FF2B5EF4-FFF2-40B4-BE49-F238E27FC236}">
-                <a16:creationId xmlns:a16="http://schemas.microsoft.com/office/drawing/2014/main" id="{CC5B122B-18AF-CD47-BB74-F197AF50C377}"/>
-              </a:ext>
-            </a:extLst>
-          </p:cNvPr>
-          <p:cNvSpPr/>
-          <p:nvPr/>
-        </p:nvSpPr>
-        <p:spPr>
-          <a:xfrm>
-            <a:off x="552570" y="1741684"/>
+            <a:off x="552570" y="2243085"/>
             <a:ext cx="2581640" cy="1173182"/>
           </a:xfrm>
           <a:prstGeom prst="roundRect">
@@ -3872,7 +3760,7 @@
         </p:nvSpPr>
         <p:spPr>
           <a:xfrm>
-            <a:off x="3216709" y="444990"/>
+            <a:off x="3216710" y="946391"/>
             <a:ext cx="2018681" cy="1260492"/>
           </a:xfrm>
           <a:prstGeom prst="roundRect">
@@ -3926,7 +3814,7 @@
         </p:nvSpPr>
         <p:spPr>
           <a:xfrm>
-            <a:off x="564484" y="444990"/>
+            <a:off x="564484" y="946391"/>
             <a:ext cx="2581640" cy="1247852"/>
           </a:xfrm>
           <a:prstGeom prst="roundRect">
@@ -3980,7 +3868,7 @@
         </p:nvSpPr>
         <p:spPr>
           <a:xfrm>
-            <a:off x="1411367" y="72437"/>
+            <a:off x="1411368" y="78270"/>
             <a:ext cx="915235" cy="285070"/>
           </a:xfrm>
           <a:prstGeom prst="rect">
@@ -4005,10 +3893,10 @@
       </p:sp>
       <p:sp>
         <p:nvSpPr>
-          <p:cNvPr id="113" name="TextBox 112">
-            <a:extLst>
-              <a:ext uri="{FF2B5EF4-FFF2-40B4-BE49-F238E27FC236}">
-                <a16:creationId xmlns:a16="http://schemas.microsoft.com/office/drawing/2014/main" id="{B6F3EA43-FD55-1A41-847A-FB3FB6085FA5}"/>
+          <p:cNvPr id="140" name="TextBox 139">
+            <a:extLst>
+              <a:ext uri="{FF2B5EF4-FFF2-40B4-BE49-F238E27FC236}">
+                <a16:creationId xmlns:a16="http://schemas.microsoft.com/office/drawing/2014/main" id="{FB738850-84D5-5344-AAA2-68A4A05D3820}"/>
               </a:ext>
             </a:extLst>
           </p:cNvPr>
@@ -4017,8 +3905,8 @@
         </p:nvSpPr>
         <p:spPr>
           <a:xfrm>
-            <a:off x="8755095" y="931563"/>
-            <a:ext cx="866756" cy="287451"/>
+            <a:off x="5174039" y="1432965"/>
+            <a:ext cx="817957" cy="287451"/>
           </a:xfrm>
           <a:prstGeom prst="rect">
             <a:avLst/>
@@ -4034,17 +3922,17 @@
             <a:pPr algn="ctr"/>
             <a:r>
               <a:rPr lang="en-US" sz="1268" dirty="0"/>
-              <a:t>gene/TSS</a:t>
-            </a:r>
-          </a:p>
-        </p:txBody>
-      </p:sp>
-      <p:sp>
-        <p:nvSpPr>
-          <p:cNvPr id="133" name="TextBox 132">
-            <a:extLst>
-              <a:ext uri="{FF2B5EF4-FFF2-40B4-BE49-F238E27FC236}">
-                <a16:creationId xmlns:a16="http://schemas.microsoft.com/office/drawing/2014/main" id="{9C929341-9D05-8B4B-B615-BA0A974ED296}"/>
+              <a:t>enzyme</a:t>
+            </a:r>
+          </a:p>
+        </p:txBody>
+      </p:sp>
+      <p:sp>
+        <p:nvSpPr>
+          <p:cNvPr id="142" name="TextBox 141">
+            <a:extLst>
+              <a:ext uri="{FF2B5EF4-FFF2-40B4-BE49-F238E27FC236}">
+                <a16:creationId xmlns:a16="http://schemas.microsoft.com/office/drawing/2014/main" id="{4914A8D7-5DDC-FC4B-82F4-C3E90D97C642}"/>
               </a:ext>
             </a:extLst>
           </p:cNvPr>
@@ -4053,8 +3941,8 @@
         </p:nvSpPr>
         <p:spPr>
           <a:xfrm>
-            <a:off x="7844203" y="931563"/>
-            <a:ext cx="992176" cy="287451"/>
+            <a:off x="3104293" y="2611219"/>
+            <a:ext cx="915235" cy="482568"/>
           </a:xfrm>
           <a:prstGeom prst="rect">
             <a:avLst/>
@@ -4070,17 +3958,24 @@
             <a:pPr algn="ctr"/>
             <a:r>
               <a:rPr lang="en-US" sz="1268" dirty="0"/>
-              <a:t>alignments</a:t>
-            </a:r>
-          </a:p>
-        </p:txBody>
-      </p:sp>
-      <p:sp>
-        <p:nvSpPr>
-          <p:cNvPr id="140" name="TextBox 139">
-            <a:extLst>
-              <a:ext uri="{FF2B5EF4-FFF2-40B4-BE49-F238E27FC236}">
-                <a16:creationId xmlns:a16="http://schemas.microsoft.com/office/drawing/2014/main" id="{FB738850-84D5-5344-AAA2-68A4A05D3820}"/>
+              <a:t>Set-level</a:t>
+            </a:r>
+          </a:p>
+          <a:p>
+            <a:pPr algn="ctr"/>
+            <a:r>
+              <a:rPr lang="en-US" sz="1268" dirty="0"/>
+              <a:t>metadata</a:t>
+            </a:r>
+          </a:p>
+        </p:txBody>
+      </p:sp>
+      <p:sp>
+        <p:nvSpPr>
+          <p:cNvPr id="3" name="TextBox 2">
+            <a:extLst>
+              <a:ext uri="{FF2B5EF4-FFF2-40B4-BE49-F238E27FC236}">
+                <a16:creationId xmlns:a16="http://schemas.microsoft.com/office/drawing/2014/main" id="{F6C1B09B-56CB-2B4A-9AA7-2227991DE6AC}"/>
               </a:ext>
             </a:extLst>
           </p:cNvPr>
@@ -4089,8 +3984,40 @@
         </p:nvSpPr>
         <p:spPr>
           <a:xfrm>
-            <a:off x="5174038" y="931563"/>
-            <a:ext cx="817957" cy="287451"/>
+            <a:off x="3356672" y="6438950"/>
+            <a:ext cx="184731" cy="362407"/>
+          </a:xfrm>
+          <a:prstGeom prst="rect">
+            <a:avLst/>
+          </a:prstGeom>
+          <a:noFill/>
+        </p:spPr>
+        <p:txBody>
+          <a:bodyPr wrap="none" rtlCol="0">
+            <a:spAutoFit/>
+          </a:bodyPr>
+          <a:lstStyle/>
+          <a:p>
+            <a:endParaRPr lang="en-US" sz="1755"/>
+          </a:p>
+        </p:txBody>
+      </p:sp>
+      <p:sp>
+        <p:nvSpPr>
+          <p:cNvPr id="26" name="TextBox 25">
+            <a:extLst>
+              <a:ext uri="{FF2B5EF4-FFF2-40B4-BE49-F238E27FC236}">
+                <a16:creationId xmlns:a16="http://schemas.microsoft.com/office/drawing/2014/main" id="{F5BF96B2-EC3E-A340-B157-D866F071224B}"/>
+              </a:ext>
+            </a:extLst>
+          </p:cNvPr>
+          <p:cNvSpPr txBox="1"/>
+          <p:nvPr/>
+        </p:nvSpPr>
+        <p:spPr>
+          <a:xfrm>
+            <a:off x="5354512" y="79286"/>
+            <a:ext cx="2138319" cy="287451"/>
           </a:xfrm>
           <a:prstGeom prst="rect">
             <a:avLst/>
@@ -4105,153 +4032,6 @@
           <a:p>
             <a:pPr algn="ctr"/>
             <a:r>
-              <a:rPr lang="en-US" sz="1268" dirty="0"/>
-              <a:t>enzyme</a:t>
-            </a:r>
-          </a:p>
-        </p:txBody>
-      </p:sp>
-      <p:sp>
-        <p:nvSpPr>
-          <p:cNvPr id="141" name="TextBox 140">
-            <a:extLst>
-              <a:ext uri="{FF2B5EF4-FFF2-40B4-BE49-F238E27FC236}">
-                <a16:creationId xmlns:a16="http://schemas.microsoft.com/office/drawing/2014/main" id="{C358CD02-8688-1D46-8BC7-E7B49D078DF8}"/>
-              </a:ext>
-            </a:extLst>
-          </p:cNvPr>
-          <p:cNvSpPr txBox="1"/>
-          <p:nvPr/>
-        </p:nvSpPr>
-        <p:spPr>
-          <a:xfrm>
-            <a:off x="7429944" y="931563"/>
-            <a:ext cx="466182" cy="287451"/>
-          </a:xfrm>
-          <a:prstGeom prst="rect">
-            <a:avLst/>
-          </a:prstGeom>
-          <a:noFill/>
-        </p:spPr>
-        <p:txBody>
-          <a:bodyPr wrap="square" rtlCol="0">
-            <a:spAutoFit/>
-          </a:bodyPr>
-          <a:lstStyle/>
-          <a:p>
-            <a:pPr algn="ctr"/>
-            <a:r>
-              <a:rPr lang="en-US" sz="1268" dirty="0"/>
-              <a:t>SNP</a:t>
-            </a:r>
-          </a:p>
-        </p:txBody>
-      </p:sp>
-      <p:sp>
-        <p:nvSpPr>
-          <p:cNvPr id="142" name="TextBox 141">
-            <a:extLst>
-              <a:ext uri="{FF2B5EF4-FFF2-40B4-BE49-F238E27FC236}">
-                <a16:creationId xmlns:a16="http://schemas.microsoft.com/office/drawing/2014/main" id="{4914A8D7-5DDC-FC4B-82F4-C3E90D97C642}"/>
-              </a:ext>
-            </a:extLst>
-          </p:cNvPr>
-          <p:cNvSpPr txBox="1"/>
-          <p:nvPr/>
-        </p:nvSpPr>
-        <p:spPr>
-          <a:xfrm>
-            <a:off x="3104292" y="2109818"/>
-            <a:ext cx="915235" cy="482568"/>
-          </a:xfrm>
-          <a:prstGeom prst="rect">
-            <a:avLst/>
-          </a:prstGeom>
-          <a:noFill/>
-        </p:spPr>
-        <p:txBody>
-          <a:bodyPr wrap="square" rtlCol="0">
-            <a:spAutoFit/>
-          </a:bodyPr>
-          <a:lstStyle/>
-          <a:p>
-            <a:pPr algn="ctr"/>
-            <a:r>
-              <a:rPr lang="en-US" sz="1268" dirty="0"/>
-              <a:t>Set-level</a:t>
-            </a:r>
-          </a:p>
-          <a:p>
-            <a:pPr algn="ctr"/>
-            <a:r>
-              <a:rPr lang="en-US" sz="1268" dirty="0"/>
-              <a:t>metadata</a:t>
-            </a:r>
-          </a:p>
-        </p:txBody>
-      </p:sp>
-      <p:sp>
-        <p:nvSpPr>
-          <p:cNvPr id="3" name="TextBox 2">
-            <a:extLst>
-              <a:ext uri="{FF2B5EF4-FFF2-40B4-BE49-F238E27FC236}">
-                <a16:creationId xmlns:a16="http://schemas.microsoft.com/office/drawing/2014/main" id="{F6C1B09B-56CB-2B4A-9AA7-2227991DE6AC}"/>
-              </a:ext>
-            </a:extLst>
-          </p:cNvPr>
-          <p:cNvSpPr txBox="1"/>
-          <p:nvPr/>
-        </p:nvSpPr>
-        <p:spPr>
-          <a:xfrm>
-            <a:off x="3356671" y="6227474"/>
-            <a:ext cx="184731" cy="362407"/>
-          </a:xfrm>
-          <a:prstGeom prst="rect">
-            <a:avLst/>
-          </a:prstGeom>
-          <a:noFill/>
-        </p:spPr>
-        <p:txBody>
-          <a:bodyPr wrap="none" rtlCol="0">
-            <a:spAutoFit/>
-          </a:bodyPr>
-          <a:lstStyle/>
-          <a:p>
-            <a:endParaRPr lang="en-US" sz="1755"/>
-          </a:p>
-        </p:txBody>
-      </p:sp>
-      <p:sp>
-        <p:nvSpPr>
-          <p:cNvPr id="26" name="TextBox 25">
-            <a:extLst>
-              <a:ext uri="{FF2B5EF4-FFF2-40B4-BE49-F238E27FC236}">
-                <a16:creationId xmlns:a16="http://schemas.microsoft.com/office/drawing/2014/main" id="{F5BF96B2-EC3E-A340-B157-D866F071224B}"/>
-              </a:ext>
-            </a:extLst>
-          </p:cNvPr>
-          <p:cNvSpPr txBox="1"/>
-          <p:nvPr/>
-        </p:nvSpPr>
-        <p:spPr>
-          <a:xfrm>
-            <a:off x="5354511" y="84602"/>
-            <a:ext cx="2138319" cy="287451"/>
-          </a:xfrm>
-          <a:prstGeom prst="rect">
-            <a:avLst/>
-          </a:prstGeom>
-          <a:noFill/>
-        </p:spPr>
-        <p:txBody>
-          <a:bodyPr wrap="square" rtlCol="0">
-            <a:spAutoFit/>
-          </a:bodyPr>
-          <a:lstStyle/>
-          <a:p>
-            <a:pPr algn="ctr"/>
-            <a:r>
               <a:rPr lang="en-US" sz="1268" dirty="0">
                 <a:latin typeface="Calibri" panose="020F0502020204030204" pitchFamily="34" charset="0"/>
                 <a:cs typeface="Calibri" panose="020F0502020204030204" pitchFamily="34" charset="0"/>
@@ -4275,7 +4055,7 @@
         </p:nvGrpSpPr>
         <p:grpSpPr>
           <a:xfrm>
-            <a:off x="366498" y="565204"/>
+            <a:off x="366498" y="1066605"/>
             <a:ext cx="2774824" cy="1294332"/>
             <a:chOff x="2499211" y="5866756"/>
             <a:chExt cx="2774824" cy="1294332"/>
@@ -4658,7 +4438,7 @@
         </p:nvSpPr>
         <p:spPr>
           <a:xfrm>
-            <a:off x="3152152" y="565219"/>
+            <a:off x="3152153" y="1066621"/>
             <a:ext cx="1691247" cy="992579"/>
           </a:xfrm>
           <a:prstGeom prst="rect">
@@ -4741,7 +4521,7 @@
         </p:nvSpPr>
         <p:spPr>
           <a:xfrm>
-            <a:off x="4701436" y="565219"/>
+            <a:off x="4701437" y="1066621"/>
             <a:ext cx="510359" cy="992579"/>
           </a:xfrm>
           <a:prstGeom prst="rect">
@@ -4824,7 +4604,7 @@
         </p:nvSpPr>
         <p:spPr>
           <a:xfrm>
-            <a:off x="4727460" y="565219"/>
+            <a:off x="4727461" y="1066621"/>
             <a:ext cx="915235" cy="392415"/>
           </a:xfrm>
           <a:prstGeom prst="rect">
@@ -4865,7 +4645,7 @@
         </p:nvSpPr>
         <p:spPr>
           <a:xfrm>
-            <a:off x="2573020" y="5646978"/>
+            <a:off x="2573021" y="5858454"/>
             <a:ext cx="1691247" cy="1140279"/>
           </a:xfrm>
           <a:prstGeom prst="rect">
@@ -4969,7 +4749,7 @@
         </p:nvSpPr>
         <p:spPr>
           <a:xfrm>
-            <a:off x="5683909" y="5646978"/>
+            <a:off x="5683910" y="5858454"/>
             <a:ext cx="510359" cy="1140279"/>
           </a:xfrm>
           <a:prstGeom prst="rect">
@@ -5055,7 +4835,7 @@
         </p:nvSpPr>
         <p:spPr>
           <a:xfrm>
-            <a:off x="4158852" y="5646978"/>
+            <a:off x="4158853" y="5858454"/>
             <a:ext cx="1691247" cy="840205"/>
           </a:xfrm>
           <a:prstGeom prst="rect">
@@ -5201,7 +4981,7 @@
         </p:nvSpPr>
         <p:spPr>
           <a:xfrm>
-            <a:off x="6085315" y="5646978"/>
+            <a:off x="6085316" y="5858454"/>
             <a:ext cx="510359" cy="1140279"/>
           </a:xfrm>
           <a:prstGeom prst="rect">
@@ -5287,7 +5067,7 @@
         </p:nvSpPr>
         <p:spPr>
           <a:xfrm>
-            <a:off x="6401736" y="5646978"/>
+            <a:off x="6401737" y="5858454"/>
             <a:ext cx="510359" cy="1140279"/>
           </a:xfrm>
           <a:prstGeom prst="rect">
@@ -5373,7 +5153,7 @@
         </p:nvSpPr>
         <p:spPr>
           <a:xfrm>
-            <a:off x="6759887" y="5646978"/>
+            <a:off x="6759888" y="5858454"/>
             <a:ext cx="510359" cy="1140279"/>
           </a:xfrm>
           <a:prstGeom prst="rect">
@@ -5459,7 +5239,7 @@
         </p:nvSpPr>
         <p:spPr>
           <a:xfrm>
-            <a:off x="6938130" y="5646978"/>
+            <a:off x="6938131" y="5858454"/>
             <a:ext cx="755529" cy="1140279"/>
           </a:xfrm>
           <a:prstGeom prst="rect">
@@ -5548,7 +5328,7 @@
         </p:nvSpPr>
         <p:spPr>
           <a:xfrm>
-            <a:off x="7518865" y="5646970"/>
+            <a:off x="7518866" y="5858445"/>
             <a:ext cx="755529" cy="842538"/>
           </a:xfrm>
           <a:prstGeom prst="rect">
@@ -5622,7 +5402,7 @@
         </p:nvSpPr>
         <p:spPr>
           <a:xfrm>
-            <a:off x="8071516" y="5646978"/>
+            <a:off x="8071517" y="5858454"/>
             <a:ext cx="555537" cy="992579"/>
           </a:xfrm>
           <a:prstGeom prst="rect">
@@ -5705,7 +5485,7 @@
         </p:nvSpPr>
         <p:spPr>
           <a:xfrm>
-            <a:off x="8429667" y="5646978"/>
+            <a:off x="8429668" y="5858454"/>
             <a:ext cx="555537" cy="992579"/>
           </a:xfrm>
           <a:prstGeom prst="rect">
@@ -5788,8 +5568,8 @@
         </p:nvSpPr>
         <p:spPr>
           <a:xfrm>
-            <a:off x="422457" y="71967"/>
-            <a:ext cx="9266718" cy="3006025"/>
+            <a:off x="422456" y="34245"/>
+            <a:ext cx="9332659" cy="3545150"/>
           </a:xfrm>
           <a:prstGeom prst="roundRect">
             <a:avLst/>
@@ -5840,7 +5620,7 @@
         </p:nvSpPr>
         <p:spPr>
           <a:xfrm>
-            <a:off x="448369" y="5646970"/>
+            <a:off x="448369" y="5858445"/>
             <a:ext cx="891450" cy="1140278"/>
           </a:xfrm>
           <a:prstGeom prst="rect">
@@ -5929,7 +5709,7 @@
         </p:nvSpPr>
         <p:spPr>
           <a:xfrm>
-            <a:off x="1240601" y="5646978"/>
+            <a:off x="1240601" y="5858454"/>
             <a:ext cx="891450" cy="840205"/>
           </a:xfrm>
           <a:prstGeom prst="rect">
@@ -6009,7 +5789,7 @@
         </p:nvSpPr>
         <p:spPr>
           <a:xfrm>
-            <a:off x="1945950" y="5646978"/>
+            <a:off x="1945951" y="5858454"/>
             <a:ext cx="707991" cy="840205"/>
           </a:xfrm>
           <a:prstGeom prst="rect">
@@ -6083,7 +5863,7 @@
         </p:nvSpPr>
         <p:spPr>
           <a:xfrm rot="16200000">
-            <a:off x="6615681" y="6180661"/>
+            <a:off x="6615682" y="6392136"/>
             <a:ext cx="279891" cy="960130"/>
           </a:xfrm>
           <a:prstGeom prst="leftBrace">
@@ -6132,7 +5912,7 @@
         </p:nvSpPr>
         <p:spPr>
           <a:xfrm rot="16200000">
-            <a:off x="7627978" y="6179588"/>
+            <a:off x="7627979" y="6391064"/>
             <a:ext cx="272747" cy="960133"/>
           </a:xfrm>
           <a:prstGeom prst="leftBrace">
@@ -6181,7 +5961,7 @@
         </p:nvSpPr>
         <p:spPr>
           <a:xfrm rot="16200000">
-            <a:off x="4275954" y="4917825"/>
+            <a:off x="4275955" y="5129300"/>
             <a:ext cx="279891" cy="3485300"/>
           </a:xfrm>
           <a:prstGeom prst="leftBrace">
@@ -6230,7 +6010,7 @@
         </p:nvSpPr>
         <p:spPr>
           <a:xfrm>
-            <a:off x="3949092" y="6767351"/>
+            <a:off x="3949093" y="6978826"/>
             <a:ext cx="964047" cy="360088"/>
           </a:xfrm>
           <a:prstGeom prst="rect">
@@ -6266,7 +6046,7 @@
         </p:nvSpPr>
         <p:spPr>
           <a:xfrm>
-            <a:off x="7298323" y="6767351"/>
+            <a:off x="7298324" y="6978826"/>
             <a:ext cx="964047" cy="360088"/>
           </a:xfrm>
           <a:prstGeom prst="rect">
@@ -6309,7 +6089,7 @@
         </p:nvSpPr>
         <p:spPr>
           <a:xfrm rot="16200000">
-            <a:off x="8505674" y="6316804"/>
+            <a:off x="8505675" y="6528279"/>
             <a:ext cx="283597" cy="689140"/>
           </a:xfrm>
           <a:prstGeom prst="leftBrace">
@@ -6358,7 +6138,7 @@
         </p:nvSpPr>
         <p:spPr>
           <a:xfrm>
-            <a:off x="8201161" y="6767351"/>
+            <a:off x="8201162" y="6978826"/>
             <a:ext cx="964047" cy="360088"/>
           </a:xfrm>
           <a:prstGeom prst="rect">
@@ -6401,7 +6181,7 @@
         </p:nvSpPr>
         <p:spPr>
           <a:xfrm rot="16200000">
-            <a:off x="1453932" y="5676017"/>
+            <a:off x="1453932" y="5887493"/>
             <a:ext cx="298852" cy="1969601"/>
           </a:xfrm>
           <a:prstGeom prst="leftBrace">
@@ -6450,7 +6230,7 @@
         </p:nvSpPr>
         <p:spPr>
           <a:xfrm>
-            <a:off x="1194324" y="6767351"/>
+            <a:off x="1194325" y="6978826"/>
             <a:ext cx="964047" cy="360088"/>
           </a:xfrm>
           <a:prstGeom prst="rect">
@@ -6486,7 +6266,7 @@
         </p:nvSpPr>
         <p:spPr>
           <a:xfrm>
-            <a:off x="2303781" y="7619784"/>
+            <a:off x="2303782" y="7831260"/>
             <a:ext cx="1130117" cy="692497"/>
           </a:xfrm>
           <a:prstGeom prst="rect">
@@ -6560,7 +6340,7 @@
         </p:nvSpPr>
         <p:spPr>
           <a:xfrm>
-            <a:off x="407364" y="7619784"/>
+            <a:off x="407364" y="7831260"/>
             <a:ext cx="891450" cy="692497"/>
           </a:xfrm>
           <a:prstGeom prst="rect">
@@ -6628,7 +6408,7 @@
         </p:nvSpPr>
         <p:spPr>
           <a:xfrm>
-            <a:off x="1067567" y="7619784"/>
+            <a:off x="1067567" y="7831260"/>
             <a:ext cx="891450" cy="692497"/>
           </a:xfrm>
           <a:prstGeom prst="rect">
@@ -6705,7 +6485,7 @@
         </p:nvSpPr>
         <p:spPr>
           <a:xfrm>
-            <a:off x="1808577" y="7619784"/>
+            <a:off x="1808578" y="7831260"/>
             <a:ext cx="707991" cy="692497"/>
           </a:xfrm>
           <a:prstGeom prst="rect">
@@ -6770,7 +6550,7 @@
         </p:nvSpPr>
         <p:spPr>
           <a:xfrm rot="16200000">
-            <a:off x="4058840" y="6792011"/>
+            <a:off x="4058841" y="7003486"/>
             <a:ext cx="279891" cy="3386176"/>
           </a:xfrm>
           <a:prstGeom prst="leftBrace">
@@ -6819,7 +6599,7 @@
         </p:nvSpPr>
         <p:spPr>
           <a:xfrm>
-            <a:off x="3490364" y="8607496"/>
+            <a:off x="3490364" y="8818972"/>
             <a:ext cx="1442234" cy="362535"/>
           </a:xfrm>
           <a:prstGeom prst="rect">
@@ -6859,7 +6639,7 @@
         </p:nvSpPr>
         <p:spPr>
           <a:xfrm>
-            <a:off x="3317362" y="7619784"/>
+            <a:off x="3317363" y="7831260"/>
             <a:ext cx="1357661" cy="692497"/>
           </a:xfrm>
           <a:prstGeom prst="rect">
@@ -6924,7 +6704,7 @@
         </p:nvSpPr>
         <p:spPr>
           <a:xfrm>
-            <a:off x="4611032" y="7619784"/>
+            <a:off x="4611033" y="7831260"/>
             <a:ext cx="1357661" cy="692497"/>
           </a:xfrm>
           <a:prstGeom prst="rect">
@@ -6989,7 +6769,7 @@
         </p:nvSpPr>
         <p:spPr>
           <a:xfrm>
-            <a:off x="5780000" y="7619784"/>
+            <a:off x="5780001" y="7831260"/>
             <a:ext cx="840981" cy="692497"/>
           </a:xfrm>
           <a:prstGeom prst="rect">
@@ -7063,7 +6843,7 @@
         </p:nvSpPr>
         <p:spPr>
           <a:xfrm>
-            <a:off x="7050075" y="7619784"/>
+            <a:off x="7050075" y="7831260"/>
             <a:ext cx="730264" cy="692497"/>
           </a:xfrm>
           <a:prstGeom prst="rect">
@@ -7137,7 +6917,7 @@
         </p:nvSpPr>
         <p:spPr>
           <a:xfrm>
-            <a:off x="8445341" y="7619784"/>
+            <a:off x="8445342" y="7831260"/>
             <a:ext cx="997013" cy="692497"/>
           </a:xfrm>
           <a:prstGeom prst="rect">
@@ -7205,7 +6985,7 @@
         </p:nvSpPr>
         <p:spPr>
           <a:xfrm>
-            <a:off x="9275429" y="7619784"/>
+            <a:off x="9275430" y="7831260"/>
             <a:ext cx="462831" cy="692497"/>
           </a:xfrm>
           <a:prstGeom prst="rect">
@@ -7270,7 +7050,7 @@
         </p:nvSpPr>
         <p:spPr>
           <a:xfrm>
-            <a:off x="6993475" y="8673543"/>
+            <a:off x="6993475" y="8885019"/>
             <a:ext cx="1442234" cy="227435"/>
           </a:xfrm>
           <a:prstGeom prst="rect">
@@ -7306,7 +7086,7 @@
         </p:nvSpPr>
         <p:spPr>
           <a:xfrm rot="16200000">
-            <a:off x="7686208" y="6619347"/>
+            <a:off x="7686208" y="6830822"/>
             <a:ext cx="263314" cy="3723300"/>
           </a:xfrm>
           <a:prstGeom prst="leftBrace">
@@ -7355,7 +7135,7 @@
         </p:nvSpPr>
         <p:spPr>
           <a:xfrm>
-            <a:off x="7462325" y="7619784"/>
+            <a:off x="7462325" y="7831260"/>
             <a:ext cx="730264" cy="692497"/>
           </a:xfrm>
           <a:prstGeom prst="rect">
@@ -7420,7 +7200,7 @@
         </p:nvSpPr>
         <p:spPr>
           <a:xfrm>
-            <a:off x="7835049" y="7619784"/>
+            <a:off x="7835049" y="7831260"/>
             <a:ext cx="730264" cy="692497"/>
           </a:xfrm>
           <a:prstGeom prst="rect">
@@ -7485,7 +7265,7 @@
         </p:nvSpPr>
         <p:spPr>
           <a:xfrm>
-            <a:off x="6457670" y="7481804"/>
+            <a:off x="6457671" y="7693279"/>
             <a:ext cx="840981" cy="842538"/>
           </a:xfrm>
           <a:prstGeom prst="rect">
@@ -7550,7 +7330,7 @@
         </p:nvSpPr>
         <p:spPr>
           <a:xfrm>
-            <a:off x="3249225" y="4639849"/>
+            <a:off x="3249226" y="4851325"/>
             <a:ext cx="184731" cy="362407"/>
           </a:xfrm>
           <a:prstGeom prst="rect">
@@ -7582,7 +7362,7 @@
         </p:nvSpPr>
         <p:spPr>
           <a:xfrm>
-            <a:off x="448369" y="4049184"/>
+            <a:off x="448369" y="4260659"/>
             <a:ext cx="891450" cy="542456"/>
           </a:xfrm>
           <a:prstGeom prst="rect">
@@ -7638,7 +7418,7 @@
         </p:nvSpPr>
         <p:spPr>
           <a:xfrm>
-            <a:off x="1133147" y="4049192"/>
+            <a:off x="1133147" y="4260668"/>
             <a:ext cx="891450" cy="392415"/>
           </a:xfrm>
           <a:prstGeom prst="rect">
@@ -7688,7 +7468,7 @@
         </p:nvSpPr>
         <p:spPr>
           <a:xfrm rot="16200000">
-            <a:off x="4262771" y="3779025"/>
+            <a:off x="4262772" y="3990501"/>
             <a:ext cx="279891" cy="1711997"/>
           </a:xfrm>
           <a:prstGeom prst="leftBrace">
@@ -7737,7 +7517,7 @@
         </p:nvSpPr>
         <p:spPr>
           <a:xfrm rot="16200000">
-            <a:off x="5505455" y="4297615"/>
+            <a:off x="5505456" y="4509091"/>
             <a:ext cx="279891" cy="674815"/>
           </a:xfrm>
           <a:prstGeom prst="leftBrace">
@@ -7786,7 +7566,7 @@
         </p:nvSpPr>
         <p:spPr>
           <a:xfrm rot="16200000">
-            <a:off x="1897461" y="3174573"/>
+            <a:off x="1897462" y="3386048"/>
             <a:ext cx="236071" cy="2902026"/>
           </a:xfrm>
           <a:prstGeom prst="leftBrace">
@@ -7835,7 +7615,7 @@
         </p:nvSpPr>
         <p:spPr>
           <a:xfrm>
-            <a:off x="1550949" y="4786669"/>
+            <a:off x="1550950" y="4998145"/>
             <a:ext cx="964047" cy="227435"/>
           </a:xfrm>
           <a:prstGeom prst="rect">
@@ -7871,7 +7651,7 @@
         </p:nvSpPr>
         <p:spPr>
           <a:xfrm>
-            <a:off x="1934426" y="4049192"/>
+            <a:off x="1934426" y="4260668"/>
             <a:ext cx="891450" cy="392415"/>
           </a:xfrm>
           <a:prstGeom prst="rect">
@@ -7921,7 +7701,7 @@
         </p:nvSpPr>
         <p:spPr>
           <a:xfrm>
-            <a:off x="3504251" y="4049192"/>
+            <a:off x="3504251" y="4260668"/>
             <a:ext cx="891450" cy="392415"/>
           </a:xfrm>
           <a:prstGeom prst="rect">
@@ -7971,7 +7751,7 @@
         </p:nvSpPr>
         <p:spPr>
           <a:xfrm>
-            <a:off x="4308104" y="4049192"/>
+            <a:off x="4308105" y="4260668"/>
             <a:ext cx="950609" cy="392415"/>
           </a:xfrm>
           <a:prstGeom prst="rect">
@@ -8021,7 +7801,7 @@
         </p:nvSpPr>
         <p:spPr>
           <a:xfrm>
-            <a:off x="2769703" y="4049192"/>
+            <a:off x="2769704" y="4260668"/>
             <a:ext cx="410253" cy="392415"/>
           </a:xfrm>
           <a:prstGeom prst="rect">
@@ -8071,7 +7851,7 @@
         </p:nvSpPr>
         <p:spPr>
           <a:xfrm>
-            <a:off x="3136463" y="4049192"/>
+            <a:off x="3136464" y="4260668"/>
             <a:ext cx="410253" cy="392415"/>
           </a:xfrm>
           <a:prstGeom prst="rect">
@@ -8121,7 +7901,7 @@
         </p:nvSpPr>
         <p:spPr>
           <a:xfrm>
-            <a:off x="4833203" y="4049192"/>
+            <a:off x="4833204" y="4260668"/>
             <a:ext cx="1179791" cy="392415"/>
           </a:xfrm>
           <a:prstGeom prst="rect">
@@ -8174,7 +7954,7 @@
         </p:nvSpPr>
         <p:spPr>
           <a:xfrm>
-            <a:off x="3899193" y="4719119"/>
+            <a:off x="3899194" y="4930595"/>
             <a:ext cx="964047" cy="362535"/>
           </a:xfrm>
           <a:prstGeom prst="rect">
@@ -8210,7 +7990,7 @@
         </p:nvSpPr>
         <p:spPr>
           <a:xfrm>
-            <a:off x="5139953" y="4719119"/>
+            <a:off x="5139954" y="4930595"/>
             <a:ext cx="964047" cy="362535"/>
           </a:xfrm>
           <a:prstGeom prst="rect">
@@ -8246,7 +8026,7 @@
         </p:nvSpPr>
         <p:spPr>
           <a:xfrm>
-            <a:off x="5336043" y="2179415"/>
+            <a:off x="5336043" y="2680817"/>
             <a:ext cx="1432632" cy="461665"/>
           </a:xfrm>
           <a:prstGeom prst="rect">
@@ -8283,7 +8063,7 @@
         </p:nvSpPr>
         <p:spPr>
           <a:xfrm>
-            <a:off x="2170625" y="1888273"/>
+            <a:off x="2170625" y="2389674"/>
             <a:ext cx="1156508" cy="338554"/>
           </a:xfrm>
           <a:prstGeom prst="rect">
@@ -8332,7 +8112,7 @@
         </p:nvSpPr>
         <p:spPr>
           <a:xfrm>
-            <a:off x="808821" y="2429679"/>
+            <a:off x="808821" y="2931080"/>
             <a:ext cx="1156508" cy="338554"/>
           </a:xfrm>
           <a:prstGeom prst="rect">
@@ -8381,7 +8161,7 @@
         </p:nvSpPr>
         <p:spPr>
           <a:xfrm>
-            <a:off x="480735" y="5357523"/>
+            <a:off x="480736" y="5568998"/>
             <a:ext cx="6754955" cy="292388"/>
           </a:xfrm>
           <a:prstGeom prst="rect">
@@ -8416,7 +8196,7 @@
         </p:nvSpPr>
         <p:spPr>
           <a:xfrm>
-            <a:off x="480735" y="7328513"/>
+            <a:off x="480736" y="7539988"/>
             <a:ext cx="4817567" cy="292388"/>
           </a:xfrm>
           <a:prstGeom prst="rect">
@@ -8451,7 +8231,7 @@
         </p:nvSpPr>
         <p:spPr>
           <a:xfrm>
-            <a:off x="480728" y="3759165"/>
+            <a:off x="480728" y="3970640"/>
             <a:ext cx="4352466" cy="292388"/>
           </a:xfrm>
           <a:prstGeom prst="rect">
@@ -8493,8 +8273,8 @@
         </p:nvCxnSpPr>
         <p:spPr>
           <a:xfrm>
-            <a:off x="3239286" y="346323"/>
-            <a:ext cx="6321559" cy="33723"/>
+            <a:off x="3239287" y="341007"/>
+            <a:ext cx="6373258" cy="0"/>
           </a:xfrm>
           <a:prstGeom prst="line">
             <a:avLst/>
@@ -8535,9 +8315,9 @@
           <p:nvPr/>
         </p:nvCxnSpPr>
         <p:spPr>
-          <a:xfrm>
-            <a:off x="625594" y="338470"/>
-            <a:ext cx="2470975" cy="7853"/>
+          <a:xfrm flipV="1">
+            <a:off x="625595" y="339939"/>
+            <a:ext cx="2508615" cy="4365"/>
           </a:xfrm>
           <a:prstGeom prst="line">
             <a:avLst/>
@@ -8577,7 +8357,7 @@
         </p:nvSpPr>
         <p:spPr>
           <a:xfrm>
-            <a:off x="5913756" y="444990"/>
+            <a:off x="5913756" y="946391"/>
             <a:ext cx="701264" cy="1247852"/>
           </a:xfrm>
           <a:prstGeom prst="roundRect">
@@ -8632,7 +8412,7 @@
         </p:nvSpPr>
         <p:spPr>
           <a:xfrm>
-            <a:off x="5860213" y="833996"/>
+            <a:off x="5860214" y="1335397"/>
             <a:ext cx="817957" cy="482568"/>
           </a:xfrm>
           <a:prstGeom prst="rect">
@@ -8675,7 +8455,7 @@
         </p:nvSpPr>
         <p:spPr>
           <a:xfrm>
-            <a:off x="6663021" y="444990"/>
+            <a:off x="6663022" y="946391"/>
             <a:ext cx="716673" cy="1247852"/>
           </a:xfrm>
           <a:prstGeom prst="roundRect">
@@ -8730,7 +8510,7 @@
         </p:nvSpPr>
         <p:spPr>
           <a:xfrm>
-            <a:off x="6615452" y="931563"/>
+            <a:off x="6615453" y="1432965"/>
             <a:ext cx="817957" cy="287451"/>
           </a:xfrm>
           <a:prstGeom prst="rect">
@@ -8769,8 +8549,8 @@
         </p:nvCxnSpPr>
         <p:spPr>
           <a:xfrm rot="5400000">
-            <a:off x="5557579" y="2153515"/>
-            <a:ext cx="2547296" cy="1636470"/>
+            <a:off x="5666313" y="2193938"/>
+            <a:ext cx="2609621" cy="1916255"/>
           </a:xfrm>
           <a:prstGeom prst="curvedConnector2">
             <a:avLst/>
@@ -8813,7 +8593,7 @@
         </p:nvCxnSpPr>
         <p:spPr>
           <a:xfrm>
-            <a:off x="9330347" y="1698101"/>
+            <a:off x="9270714" y="1909577"/>
             <a:ext cx="32199" cy="5936019"/>
           </a:xfrm>
           <a:prstGeom prst="straightConnector1">
@@ -8857,7 +8637,7 @@
         </p:nvCxnSpPr>
         <p:spPr>
           <a:xfrm>
-            <a:off x="8321817" y="1684652"/>
+            <a:off x="8460964" y="1896127"/>
             <a:ext cx="5377" cy="3965992"/>
           </a:xfrm>
           <a:prstGeom prst="straightConnector1">
@@ -8899,7 +8679,7 @@
         </p:nvSpPr>
         <p:spPr>
           <a:xfrm>
-            <a:off x="747382" y="1840638"/>
+            <a:off x="747383" y="2342039"/>
             <a:ext cx="1740155" cy="455802"/>
           </a:xfrm>
           <a:prstGeom prst="roundRect">
@@ -8955,7 +8735,7 @@
         </p:nvSpPr>
         <p:spPr>
           <a:xfrm>
-            <a:off x="1043921" y="1910600"/>
+            <a:off x="1043921" y="2412001"/>
             <a:ext cx="1156508" cy="338554"/>
           </a:xfrm>
           <a:prstGeom prst="rect">
@@ -9004,7 +8784,7 @@
         </p:nvSpPr>
         <p:spPr>
           <a:xfrm>
-            <a:off x="747079" y="2441583"/>
+            <a:off x="747079" y="2942985"/>
             <a:ext cx="346252" cy="339157"/>
           </a:xfrm>
           <a:prstGeom prst="roundRect">
@@ -9060,7 +8840,7 @@
         </p:nvSpPr>
         <p:spPr>
           <a:xfrm>
-            <a:off x="342358" y="2490470"/>
+            <a:off x="342358" y="2991871"/>
             <a:ext cx="1156508" cy="215444"/>
           </a:xfrm>
           <a:prstGeom prst="rect">
@@ -9099,7 +8879,7 @@
         </p:nvSpPr>
         <p:spPr>
           <a:xfrm>
-            <a:off x="1690306" y="2441583"/>
+            <a:off x="1690306" y="2942985"/>
             <a:ext cx="797224" cy="332603"/>
           </a:xfrm>
           <a:prstGeom prst="roundRect">
@@ -9155,7 +8935,7 @@
         </p:nvSpPr>
         <p:spPr>
           <a:xfrm>
-            <a:off x="2170625" y="2428915"/>
+            <a:off x="2170625" y="2930316"/>
             <a:ext cx="1156508" cy="338554"/>
           </a:xfrm>
           <a:prstGeom prst="rect">
@@ -9204,7 +8984,7 @@
         </p:nvSpPr>
         <p:spPr>
           <a:xfrm>
-            <a:off x="1507937" y="2490470"/>
+            <a:off x="1507937" y="2991871"/>
             <a:ext cx="1156508" cy="215444"/>
           </a:xfrm>
           <a:prstGeom prst="rect">
@@ -9238,177 +9018,6 @@
       </p:sp>
       <p:sp>
         <p:nvSpPr>
-          <p:cNvPr id="183" name="Rounded Rectangle 182">
-            <a:extLst>
-              <a:ext uri="{FF2B5EF4-FFF2-40B4-BE49-F238E27FC236}">
-                <a16:creationId xmlns:a16="http://schemas.microsoft.com/office/drawing/2014/main" id="{4FC471AF-3110-224C-B603-97229E1FA59F}"/>
-              </a:ext>
-            </a:extLst>
-          </p:cNvPr>
-          <p:cNvSpPr/>
-          <p:nvPr/>
-        </p:nvSpPr>
-        <p:spPr>
-          <a:xfrm>
-            <a:off x="7430866" y="720399"/>
-            <a:ext cx="460067" cy="164064"/>
-          </a:xfrm>
-          <a:prstGeom prst="roundRect">
-            <a:avLst/>
-          </a:prstGeom>
-          <a:solidFill>
-            <a:srgbClr val="84A38E"/>
-          </a:solidFill>
-          <a:ln>
-            <a:noFill/>
-            <a:prstDash val="solid"/>
-          </a:ln>
-        </p:spPr>
-        <p:style>
-          <a:lnRef idx="2">
-            <a:schemeClr val="accent1">
-              <a:shade val="50000"/>
-            </a:schemeClr>
-          </a:lnRef>
-          <a:fillRef idx="1">
-            <a:schemeClr val="accent1"/>
-          </a:fillRef>
-          <a:effectRef idx="0">
-            <a:schemeClr val="accent1"/>
-          </a:effectRef>
-          <a:fontRef idx="minor">
-            <a:schemeClr val="lt1"/>
-          </a:fontRef>
-        </p:style>
-        <p:txBody>
-          <a:bodyPr rtlCol="0" anchor="ctr"/>
-          <a:lstStyle/>
-          <a:p>
-            <a:pPr algn="ctr"/>
-            <a:endParaRPr lang="en-US">
-              <a:solidFill>
-                <a:srgbClr val="FFF5D7"/>
-              </a:solidFill>
-            </a:endParaRPr>
-          </a:p>
-        </p:txBody>
-      </p:sp>
-      <p:sp>
-        <p:nvSpPr>
-          <p:cNvPr id="184" name="Rounded Rectangle 183">
-            <a:extLst>
-              <a:ext uri="{FF2B5EF4-FFF2-40B4-BE49-F238E27FC236}">
-                <a16:creationId xmlns:a16="http://schemas.microsoft.com/office/drawing/2014/main" id="{5E0B76FD-8EA8-F044-B2C7-7E26A8ABE325}"/>
-              </a:ext>
-            </a:extLst>
-          </p:cNvPr>
-          <p:cNvSpPr/>
-          <p:nvPr/>
-        </p:nvSpPr>
-        <p:spPr>
-          <a:xfrm>
-            <a:off x="7954238" y="719316"/>
-            <a:ext cx="782939" cy="164064"/>
-          </a:xfrm>
-          <a:prstGeom prst="roundRect">
-            <a:avLst/>
-          </a:prstGeom>
-          <a:solidFill>
-            <a:srgbClr val="9CAE8F"/>
-          </a:solidFill>
-          <a:ln>
-            <a:noFill/>
-            <a:prstDash val="solid"/>
-          </a:ln>
-        </p:spPr>
-        <p:style>
-          <a:lnRef idx="2">
-            <a:schemeClr val="accent1">
-              <a:shade val="50000"/>
-            </a:schemeClr>
-          </a:lnRef>
-          <a:fillRef idx="1">
-            <a:schemeClr val="accent1"/>
-          </a:fillRef>
-          <a:effectRef idx="0">
-            <a:schemeClr val="accent1"/>
-          </a:effectRef>
-          <a:fontRef idx="minor">
-            <a:schemeClr val="lt1"/>
-          </a:fontRef>
-        </p:style>
-        <p:txBody>
-          <a:bodyPr rtlCol="0" anchor="ctr"/>
-          <a:lstStyle/>
-          <a:p>
-            <a:pPr algn="ctr"/>
-            <a:endParaRPr lang="en-US">
-              <a:solidFill>
-                <a:srgbClr val="FFF5D7"/>
-              </a:solidFill>
-            </a:endParaRPr>
-          </a:p>
-        </p:txBody>
-      </p:sp>
-      <p:sp>
-        <p:nvSpPr>
-          <p:cNvPr id="186" name="Rounded Rectangle 185">
-            <a:extLst>
-              <a:ext uri="{FF2B5EF4-FFF2-40B4-BE49-F238E27FC236}">
-                <a16:creationId xmlns:a16="http://schemas.microsoft.com/office/drawing/2014/main" id="{1A7DDFF6-6B04-9B45-AD59-1B80A40A792A}"/>
-              </a:ext>
-            </a:extLst>
-          </p:cNvPr>
-          <p:cNvSpPr/>
-          <p:nvPr/>
-        </p:nvSpPr>
-        <p:spPr>
-          <a:xfrm>
-            <a:off x="8785045" y="724155"/>
-            <a:ext cx="773455" cy="164064"/>
-          </a:xfrm>
-          <a:prstGeom prst="roundRect">
-            <a:avLst/>
-          </a:prstGeom>
-          <a:solidFill>
-            <a:srgbClr val="9AA599"/>
-          </a:solidFill>
-          <a:ln>
-            <a:noFill/>
-            <a:prstDash val="solid"/>
-          </a:ln>
-        </p:spPr>
-        <p:style>
-          <a:lnRef idx="2">
-            <a:schemeClr val="accent1">
-              <a:shade val="50000"/>
-            </a:schemeClr>
-          </a:lnRef>
-          <a:fillRef idx="1">
-            <a:schemeClr val="accent1"/>
-          </a:fillRef>
-          <a:effectRef idx="0">
-            <a:schemeClr val="accent1"/>
-          </a:effectRef>
-          <a:fontRef idx="minor">
-            <a:schemeClr val="lt1"/>
-          </a:fontRef>
-        </p:style>
-        <p:txBody>
-          <a:bodyPr rtlCol="0" anchor="ctr"/>
-          <a:lstStyle/>
-          <a:p>
-            <a:pPr algn="ctr"/>
-            <a:endParaRPr lang="en-US">
-              <a:solidFill>
-                <a:srgbClr val="FFF5D7"/>
-              </a:solidFill>
-            </a:endParaRPr>
-          </a:p>
-        </p:txBody>
-      </p:sp>
-      <p:sp>
-        <p:nvSpPr>
           <p:cNvPr id="188" name="TextBox 187">
             <a:extLst>
               <a:ext uri="{FF2B5EF4-FFF2-40B4-BE49-F238E27FC236}">
@@ -9421,7 +9030,7 @@
         </p:nvSpPr>
         <p:spPr>
           <a:xfrm>
-            <a:off x="-23197" y="-109008"/>
+            <a:off x="-23197" y="-178964"/>
             <a:ext cx="373820" cy="553998"/>
           </a:xfrm>
           <a:prstGeom prst="rect">
@@ -9456,7 +9065,7 @@
         </p:nvSpPr>
         <p:spPr>
           <a:xfrm>
-            <a:off x="-23197" y="3628881"/>
+            <a:off x="-23197" y="3840356"/>
             <a:ext cx="391454" cy="553998"/>
           </a:xfrm>
           <a:prstGeom prst="rect">
@@ -9499,7 +9108,7 @@
         </p:blipFill>
         <p:spPr>
           <a:xfrm>
-            <a:off x="360296" y="9122394"/>
+            <a:off x="360296" y="9333870"/>
             <a:ext cx="9394820" cy="2348705"/>
           </a:xfrm>
           <a:prstGeom prst="rect">
@@ -9521,7 +9130,7 @@
         </p:nvSpPr>
         <p:spPr>
           <a:xfrm>
-            <a:off x="-23197" y="9021080"/>
+            <a:off x="-23197" y="9232555"/>
             <a:ext cx="344966" cy="553998"/>
           </a:xfrm>
           <a:prstGeom prst="rect">
@@ -9558,7 +9167,7 @@
         </p:nvCxnSpPr>
         <p:spPr>
           <a:xfrm>
-            <a:off x="3033011" y="11525477"/>
+            <a:off x="3033011" y="11736952"/>
             <a:ext cx="0" cy="165100"/>
           </a:xfrm>
           <a:prstGeom prst="line">
@@ -9601,7 +9210,7 @@
         </p:nvCxnSpPr>
         <p:spPr>
           <a:xfrm>
-            <a:off x="3045512" y="11717141"/>
+            <a:off x="3045512" y="11928616"/>
             <a:ext cx="0" cy="165100"/>
           </a:xfrm>
           <a:prstGeom prst="line">
@@ -9644,7 +9253,7 @@
         </p:nvCxnSpPr>
         <p:spPr>
           <a:xfrm>
-            <a:off x="3927220" y="11525477"/>
+            <a:off x="3927220" y="11736952"/>
             <a:ext cx="0" cy="165100"/>
           </a:xfrm>
           <a:prstGeom prst="line">
@@ -9687,7 +9296,7 @@
         </p:nvCxnSpPr>
         <p:spPr>
           <a:xfrm>
-            <a:off x="8636991" y="11525477"/>
+            <a:off x="8636991" y="11736952"/>
             <a:ext cx="0" cy="165100"/>
           </a:xfrm>
           <a:prstGeom prst="line">
@@ -9728,7 +9337,7 @@
         </p:nvSpPr>
         <p:spPr>
           <a:xfrm>
-            <a:off x="478995" y="11400533"/>
+            <a:off x="478996" y="11612009"/>
             <a:ext cx="435977" cy="638961"/>
           </a:xfrm>
           <a:prstGeom prst="rect">
@@ -9780,7 +9389,7 @@
         </p:nvSpPr>
         <p:spPr>
           <a:xfrm>
-            <a:off x="494545" y="10316279"/>
+            <a:off x="494546" y="10527755"/>
             <a:ext cx="420427" cy="985579"/>
           </a:xfrm>
           <a:prstGeom prst="rect">
@@ -9832,7 +9441,7 @@
         </p:nvSpPr>
         <p:spPr>
           <a:xfrm rot="16200000">
-            <a:off x="-20046" y="10637568"/>
+            <a:off x="-20046" y="10849044"/>
             <a:ext cx="1414171" cy="323165"/>
           </a:xfrm>
           <a:prstGeom prst="rect">
@@ -9872,7 +9481,7 @@
         </p:nvSpPr>
         <p:spPr>
           <a:xfrm rot="16200000">
-            <a:off x="-20045" y="11539953"/>
+            <a:off x="-20045" y="11751429"/>
             <a:ext cx="1414171" cy="323165"/>
           </a:xfrm>
           <a:prstGeom prst="rect">
@@ -9912,7 +9521,7 @@
         </p:nvSpPr>
         <p:spPr>
           <a:xfrm>
-            <a:off x="2549816" y="11487395"/>
+            <a:off x="2549816" y="11698871"/>
             <a:ext cx="1432632" cy="246221"/>
           </a:xfrm>
           <a:prstGeom prst="rect">
@@ -9948,7 +9557,7 @@
         </p:nvSpPr>
         <p:spPr>
           <a:xfrm>
-            <a:off x="2572041" y="11666242"/>
+            <a:off x="2572041" y="11877718"/>
             <a:ext cx="1432632" cy="246221"/>
           </a:xfrm>
           <a:prstGeom prst="rect">
@@ -9984,7 +9593,7 @@
         </p:nvSpPr>
         <p:spPr>
           <a:xfrm>
-            <a:off x="3467167" y="11493315"/>
+            <a:off x="3467167" y="11704791"/>
             <a:ext cx="1432632" cy="246221"/>
           </a:xfrm>
           <a:prstGeom prst="rect">
@@ -10020,7 +9629,7 @@
         </p:nvSpPr>
         <p:spPr>
           <a:xfrm>
-            <a:off x="8204327" y="11484923"/>
+            <a:off x="8204327" y="11696399"/>
             <a:ext cx="1432632" cy="246221"/>
           </a:xfrm>
           <a:prstGeom prst="rect">
@@ -10056,7 +9665,7 @@
         </p:nvSpPr>
         <p:spPr>
           <a:xfrm>
-            <a:off x="6277794" y="6764893"/>
+            <a:off x="6277795" y="6976368"/>
             <a:ext cx="964047" cy="360088"/>
           </a:xfrm>
           <a:prstGeom prst="rect">
@@ -10081,6 +9690,959 @@
             <a:r>
               <a:rPr lang="en-US" sz="878" dirty="0"/>
               <a:t>information</a:t>
+            </a:r>
+          </a:p>
+        </p:txBody>
+      </p:sp>
+      <p:sp>
+        <p:nvSpPr>
+          <p:cNvPr id="196" name="Rounded Rectangle 195">
+            <a:extLst>
+              <a:ext uri="{FF2B5EF4-FFF2-40B4-BE49-F238E27FC236}">
+                <a16:creationId xmlns:a16="http://schemas.microsoft.com/office/drawing/2014/main" id="{3F0F8581-6956-30E0-CCEC-5070232B0DC3}"/>
+              </a:ext>
+            </a:extLst>
+          </p:cNvPr>
+          <p:cNvSpPr/>
+          <p:nvPr/>
+        </p:nvSpPr>
+        <p:spPr>
+          <a:xfrm>
+            <a:off x="7521201" y="884951"/>
+            <a:ext cx="466182" cy="1247852"/>
+          </a:xfrm>
+          <a:prstGeom prst="roundRect">
+            <a:avLst/>
+          </a:prstGeom>
+          <a:solidFill>
+            <a:srgbClr val="C0F3CE"/>
+          </a:solidFill>
+          <a:ln>
+            <a:solidFill>
+              <a:schemeClr val="tx1"/>
+            </a:solidFill>
+            <a:prstDash val="solid"/>
+          </a:ln>
+        </p:spPr>
+        <p:style>
+          <a:lnRef idx="2">
+            <a:schemeClr val="accent1">
+              <a:shade val="50000"/>
+            </a:schemeClr>
+          </a:lnRef>
+          <a:fillRef idx="1">
+            <a:schemeClr val="accent1"/>
+          </a:fillRef>
+          <a:effectRef idx="0">
+            <a:schemeClr val="accent1"/>
+          </a:effectRef>
+          <a:fontRef idx="minor">
+            <a:schemeClr val="lt1"/>
+          </a:fontRef>
+        </p:style>
+        <p:txBody>
+          <a:bodyPr rtlCol="0" anchor="ctr"/>
+          <a:lstStyle/>
+          <a:p>
+            <a:pPr algn="ctr"/>
+            <a:endParaRPr lang="en-US">
+              <a:solidFill>
+                <a:srgbClr val="FFF5D7"/>
+              </a:solidFill>
+            </a:endParaRPr>
+          </a:p>
+        </p:txBody>
+      </p:sp>
+      <p:sp>
+        <p:nvSpPr>
+          <p:cNvPr id="197" name="Rounded Rectangle 196">
+            <a:extLst>
+              <a:ext uri="{FF2B5EF4-FFF2-40B4-BE49-F238E27FC236}">
+                <a16:creationId xmlns:a16="http://schemas.microsoft.com/office/drawing/2014/main" id="{1D071F3E-3F8E-3552-BFD5-CA72E0816C71}"/>
+              </a:ext>
+            </a:extLst>
+          </p:cNvPr>
+          <p:cNvSpPr/>
+          <p:nvPr/>
+        </p:nvSpPr>
+        <p:spPr>
+          <a:xfrm>
+            <a:off x="7481486" y="916258"/>
+            <a:ext cx="466182" cy="1247852"/>
+          </a:xfrm>
+          <a:prstGeom prst="roundRect">
+            <a:avLst/>
+          </a:prstGeom>
+          <a:solidFill>
+            <a:srgbClr val="C0F3CE"/>
+          </a:solidFill>
+          <a:ln>
+            <a:solidFill>
+              <a:schemeClr val="tx1"/>
+            </a:solidFill>
+            <a:prstDash val="solid"/>
+          </a:ln>
+        </p:spPr>
+        <p:style>
+          <a:lnRef idx="2">
+            <a:schemeClr val="accent1">
+              <a:shade val="50000"/>
+            </a:schemeClr>
+          </a:lnRef>
+          <a:fillRef idx="1">
+            <a:schemeClr val="accent1"/>
+          </a:fillRef>
+          <a:effectRef idx="0">
+            <a:schemeClr val="accent1"/>
+          </a:effectRef>
+          <a:fontRef idx="minor">
+            <a:schemeClr val="lt1"/>
+          </a:fontRef>
+        </p:style>
+        <p:txBody>
+          <a:bodyPr rtlCol="0" anchor="ctr"/>
+          <a:lstStyle/>
+          <a:p>
+            <a:pPr algn="ctr"/>
+            <a:endParaRPr lang="en-US">
+              <a:solidFill>
+                <a:srgbClr val="FFF5D7"/>
+              </a:solidFill>
+            </a:endParaRPr>
+          </a:p>
+        </p:txBody>
+      </p:sp>
+      <p:sp>
+        <p:nvSpPr>
+          <p:cNvPr id="198" name="Rounded Rectangle 197">
+            <a:extLst>
+              <a:ext uri="{FF2B5EF4-FFF2-40B4-BE49-F238E27FC236}">
+                <a16:creationId xmlns:a16="http://schemas.microsoft.com/office/drawing/2014/main" id="{E539A5F0-E59F-154D-C75D-3C3AC6FC4AFC}"/>
+              </a:ext>
+            </a:extLst>
+          </p:cNvPr>
+          <p:cNvSpPr/>
+          <p:nvPr/>
+        </p:nvSpPr>
+        <p:spPr>
+          <a:xfrm>
+            <a:off x="7438479" y="950309"/>
+            <a:ext cx="466182" cy="1247852"/>
+          </a:xfrm>
+          <a:prstGeom prst="roundRect">
+            <a:avLst/>
+          </a:prstGeom>
+          <a:solidFill>
+            <a:srgbClr val="9EC9AA"/>
+          </a:solidFill>
+          <a:ln>
+            <a:solidFill>
+              <a:schemeClr val="tx1"/>
+            </a:solidFill>
+            <a:prstDash val="solid"/>
+          </a:ln>
+        </p:spPr>
+        <p:style>
+          <a:lnRef idx="2">
+            <a:schemeClr val="accent1">
+              <a:shade val="50000"/>
+            </a:schemeClr>
+          </a:lnRef>
+          <a:fillRef idx="1">
+            <a:schemeClr val="accent1"/>
+          </a:fillRef>
+          <a:effectRef idx="0">
+            <a:schemeClr val="accent1"/>
+          </a:effectRef>
+          <a:fontRef idx="minor">
+            <a:schemeClr val="lt1"/>
+          </a:fontRef>
+        </p:style>
+        <p:txBody>
+          <a:bodyPr rtlCol="0" anchor="ctr"/>
+          <a:lstStyle/>
+          <a:p>
+            <a:pPr algn="ctr"/>
+            <a:endParaRPr lang="en-US">
+              <a:solidFill>
+                <a:srgbClr val="FFF5D7"/>
+              </a:solidFill>
+            </a:endParaRPr>
+          </a:p>
+        </p:txBody>
+      </p:sp>
+      <p:sp>
+        <p:nvSpPr>
+          <p:cNvPr id="141" name="TextBox 140">
+            <a:extLst>
+              <a:ext uri="{FF2B5EF4-FFF2-40B4-BE49-F238E27FC236}">
+                <a16:creationId xmlns:a16="http://schemas.microsoft.com/office/drawing/2014/main" id="{C358CD02-8688-1D46-8BC7-E7B49D078DF8}"/>
+              </a:ext>
+            </a:extLst>
+          </p:cNvPr>
+          <p:cNvSpPr txBox="1"/>
+          <p:nvPr/>
+        </p:nvSpPr>
+        <p:spPr>
+          <a:xfrm>
+            <a:off x="7445295" y="1418001"/>
+            <a:ext cx="466182" cy="287451"/>
+          </a:xfrm>
+          <a:prstGeom prst="rect">
+            <a:avLst/>
+          </a:prstGeom>
+          <a:noFill/>
+        </p:spPr>
+        <p:txBody>
+          <a:bodyPr wrap="square" rtlCol="0">
+            <a:spAutoFit/>
+          </a:bodyPr>
+          <a:lstStyle/>
+          <a:p>
+            <a:pPr algn="ctr"/>
+            <a:r>
+              <a:rPr lang="en-US" sz="1268" dirty="0"/>
+              <a:t>SNP</a:t>
+            </a:r>
+          </a:p>
+        </p:txBody>
+      </p:sp>
+      <p:sp>
+        <p:nvSpPr>
+          <p:cNvPr id="219" name="Rounded Rectangle 218">
+            <a:extLst>
+              <a:ext uri="{FF2B5EF4-FFF2-40B4-BE49-F238E27FC236}">
+                <a16:creationId xmlns:a16="http://schemas.microsoft.com/office/drawing/2014/main" id="{0922650E-4041-30AF-4933-83FC01179722}"/>
+              </a:ext>
+            </a:extLst>
+          </p:cNvPr>
+          <p:cNvSpPr/>
+          <p:nvPr/>
+        </p:nvSpPr>
+        <p:spPr>
+          <a:xfrm>
+            <a:off x="8193510" y="850112"/>
+            <a:ext cx="798298" cy="1247852"/>
+          </a:xfrm>
+          <a:prstGeom prst="roundRect">
+            <a:avLst/>
+          </a:prstGeom>
+          <a:solidFill>
+            <a:srgbClr val="E6FFD2"/>
+          </a:solidFill>
+          <a:ln>
+            <a:solidFill>
+              <a:schemeClr val="tx1"/>
+            </a:solidFill>
+            <a:prstDash val="solid"/>
+          </a:ln>
+        </p:spPr>
+        <p:style>
+          <a:lnRef idx="2">
+            <a:schemeClr val="accent1">
+              <a:shade val="50000"/>
+            </a:schemeClr>
+          </a:lnRef>
+          <a:fillRef idx="1">
+            <a:schemeClr val="accent1"/>
+          </a:fillRef>
+          <a:effectRef idx="0">
+            <a:schemeClr val="accent1"/>
+          </a:effectRef>
+          <a:fontRef idx="minor">
+            <a:schemeClr val="lt1"/>
+          </a:fontRef>
+        </p:style>
+        <p:txBody>
+          <a:bodyPr rtlCol="0" anchor="ctr"/>
+          <a:lstStyle/>
+          <a:p>
+            <a:pPr algn="ctr"/>
+            <a:endParaRPr lang="en-US">
+              <a:solidFill>
+                <a:srgbClr val="FFF5D7"/>
+              </a:solidFill>
+            </a:endParaRPr>
+          </a:p>
+        </p:txBody>
+      </p:sp>
+      <p:sp>
+        <p:nvSpPr>
+          <p:cNvPr id="220" name="Rounded Rectangle 219">
+            <a:extLst>
+              <a:ext uri="{FF2B5EF4-FFF2-40B4-BE49-F238E27FC236}">
+                <a16:creationId xmlns:a16="http://schemas.microsoft.com/office/drawing/2014/main" id="{CC1F1CF6-59D1-8944-1971-54D6613E9FB0}"/>
+              </a:ext>
+            </a:extLst>
+          </p:cNvPr>
+          <p:cNvSpPr/>
+          <p:nvPr/>
+        </p:nvSpPr>
+        <p:spPr>
+          <a:xfrm>
+            <a:off x="8153263" y="881419"/>
+            <a:ext cx="795032" cy="1247852"/>
+          </a:xfrm>
+          <a:prstGeom prst="roundRect">
+            <a:avLst/>
+          </a:prstGeom>
+          <a:solidFill>
+            <a:srgbClr val="E6FFD2"/>
+          </a:solidFill>
+          <a:ln>
+            <a:solidFill>
+              <a:schemeClr val="tx1"/>
+            </a:solidFill>
+            <a:prstDash val="solid"/>
+          </a:ln>
+        </p:spPr>
+        <p:style>
+          <a:lnRef idx="2">
+            <a:schemeClr val="accent1">
+              <a:shade val="50000"/>
+            </a:schemeClr>
+          </a:lnRef>
+          <a:fillRef idx="1">
+            <a:schemeClr val="accent1"/>
+          </a:fillRef>
+          <a:effectRef idx="0">
+            <a:schemeClr val="accent1"/>
+          </a:effectRef>
+          <a:fontRef idx="minor">
+            <a:schemeClr val="lt1"/>
+          </a:fontRef>
+        </p:style>
+        <p:txBody>
+          <a:bodyPr rtlCol="0" anchor="ctr"/>
+          <a:lstStyle/>
+          <a:p>
+            <a:pPr algn="ctr"/>
+            <a:endParaRPr lang="en-US">
+              <a:solidFill>
+                <a:srgbClr val="FFF5D7"/>
+              </a:solidFill>
+            </a:endParaRPr>
+          </a:p>
+        </p:txBody>
+      </p:sp>
+      <p:sp>
+        <p:nvSpPr>
+          <p:cNvPr id="221" name="Rounded Rectangle 220">
+            <a:extLst>
+              <a:ext uri="{FF2B5EF4-FFF2-40B4-BE49-F238E27FC236}">
+                <a16:creationId xmlns:a16="http://schemas.microsoft.com/office/drawing/2014/main" id="{1E4317EB-9237-E529-C484-31059BC6B2EC}"/>
+              </a:ext>
+            </a:extLst>
+          </p:cNvPr>
+          <p:cNvSpPr/>
+          <p:nvPr/>
+        </p:nvSpPr>
+        <p:spPr>
+          <a:xfrm>
+            <a:off x="8113547" y="912726"/>
+            <a:ext cx="798297" cy="1247852"/>
+          </a:xfrm>
+          <a:prstGeom prst="roundRect">
+            <a:avLst/>
+          </a:prstGeom>
+          <a:solidFill>
+            <a:srgbClr val="E6FFD2"/>
+          </a:solidFill>
+          <a:ln>
+            <a:solidFill>
+              <a:schemeClr val="tx1"/>
+            </a:solidFill>
+            <a:prstDash val="solid"/>
+          </a:ln>
+        </p:spPr>
+        <p:style>
+          <a:lnRef idx="2">
+            <a:schemeClr val="accent1">
+              <a:shade val="50000"/>
+            </a:schemeClr>
+          </a:lnRef>
+          <a:fillRef idx="1">
+            <a:schemeClr val="accent1"/>
+          </a:fillRef>
+          <a:effectRef idx="0">
+            <a:schemeClr val="accent1"/>
+          </a:effectRef>
+          <a:fontRef idx="minor">
+            <a:schemeClr val="lt1"/>
+          </a:fontRef>
+        </p:style>
+        <p:txBody>
+          <a:bodyPr rtlCol="0" anchor="ctr"/>
+          <a:lstStyle/>
+          <a:p>
+            <a:pPr algn="ctr"/>
+            <a:endParaRPr lang="en-US">
+              <a:solidFill>
+                <a:srgbClr val="FFF5D7"/>
+              </a:solidFill>
+            </a:endParaRPr>
+          </a:p>
+        </p:txBody>
+      </p:sp>
+      <p:sp>
+        <p:nvSpPr>
+          <p:cNvPr id="222" name="Rounded Rectangle 221">
+            <a:extLst>
+              <a:ext uri="{FF2B5EF4-FFF2-40B4-BE49-F238E27FC236}">
+                <a16:creationId xmlns:a16="http://schemas.microsoft.com/office/drawing/2014/main" id="{8A8E8CA1-69B1-6005-912C-9BF039A21C22}"/>
+              </a:ext>
+            </a:extLst>
+          </p:cNvPr>
+          <p:cNvSpPr/>
+          <p:nvPr/>
+        </p:nvSpPr>
+        <p:spPr>
+          <a:xfrm>
+            <a:off x="8070540" y="946777"/>
+            <a:ext cx="793329" cy="1247852"/>
+          </a:xfrm>
+          <a:prstGeom prst="roundRect">
+            <a:avLst/>
+          </a:prstGeom>
+          <a:solidFill>
+            <a:srgbClr val="C1D8B1"/>
+          </a:solidFill>
+          <a:ln>
+            <a:solidFill>
+              <a:schemeClr val="tx1"/>
+            </a:solidFill>
+            <a:prstDash val="solid"/>
+          </a:ln>
+        </p:spPr>
+        <p:style>
+          <a:lnRef idx="2">
+            <a:schemeClr val="accent1">
+              <a:shade val="50000"/>
+            </a:schemeClr>
+          </a:lnRef>
+          <a:fillRef idx="1">
+            <a:schemeClr val="accent1"/>
+          </a:fillRef>
+          <a:effectRef idx="0">
+            <a:schemeClr val="accent1"/>
+          </a:effectRef>
+          <a:fontRef idx="minor">
+            <a:schemeClr val="lt1"/>
+          </a:fontRef>
+        </p:style>
+        <p:txBody>
+          <a:bodyPr rtlCol="0" anchor="ctr"/>
+          <a:lstStyle/>
+          <a:p>
+            <a:pPr algn="ctr"/>
+            <a:endParaRPr lang="en-US">
+              <a:solidFill>
+                <a:srgbClr val="FFF5D7"/>
+              </a:solidFill>
+            </a:endParaRPr>
+          </a:p>
+        </p:txBody>
+      </p:sp>
+      <p:sp>
+        <p:nvSpPr>
+          <p:cNvPr id="223" name="TextBox 222">
+            <a:extLst>
+              <a:ext uri="{FF2B5EF4-FFF2-40B4-BE49-F238E27FC236}">
+                <a16:creationId xmlns:a16="http://schemas.microsoft.com/office/drawing/2014/main" id="{E04A58FF-1780-7A71-D393-724C0BAA0C5A}"/>
+              </a:ext>
+            </a:extLst>
+          </p:cNvPr>
+          <p:cNvSpPr txBox="1"/>
+          <p:nvPr/>
+        </p:nvSpPr>
+        <p:spPr>
+          <a:xfrm>
+            <a:off x="8001001" y="1404637"/>
+            <a:ext cx="947625" cy="287451"/>
+          </a:xfrm>
+          <a:prstGeom prst="rect">
+            <a:avLst/>
+          </a:prstGeom>
+          <a:noFill/>
+        </p:spPr>
+        <p:txBody>
+          <a:bodyPr wrap="square" rtlCol="0">
+            <a:spAutoFit/>
+          </a:bodyPr>
+          <a:lstStyle/>
+          <a:p>
+            <a:pPr algn="ctr"/>
+            <a:r>
+              <a:rPr lang="en-US" sz="1268" dirty="0"/>
+              <a:t>Alignments</a:t>
+            </a:r>
+          </a:p>
+        </p:txBody>
+      </p:sp>
+      <p:sp>
+        <p:nvSpPr>
+          <p:cNvPr id="224" name="Rounded Rectangle 223">
+            <a:extLst>
+              <a:ext uri="{FF2B5EF4-FFF2-40B4-BE49-F238E27FC236}">
+                <a16:creationId xmlns:a16="http://schemas.microsoft.com/office/drawing/2014/main" id="{792B6538-5165-D881-44A3-4F2281244E6A}"/>
+              </a:ext>
+            </a:extLst>
+          </p:cNvPr>
+          <p:cNvSpPr/>
+          <p:nvPr/>
+        </p:nvSpPr>
+        <p:spPr>
+          <a:xfrm>
+            <a:off x="9146363" y="855337"/>
+            <a:ext cx="466182" cy="1247852"/>
+          </a:xfrm>
+          <a:prstGeom prst="roundRect">
+            <a:avLst/>
+          </a:prstGeom>
+          <a:solidFill>
+            <a:srgbClr val="EEFCE9"/>
+          </a:solidFill>
+          <a:ln>
+            <a:solidFill>
+              <a:schemeClr val="tx1"/>
+            </a:solidFill>
+            <a:prstDash val="solid"/>
+          </a:ln>
+        </p:spPr>
+        <p:style>
+          <a:lnRef idx="2">
+            <a:schemeClr val="accent1">
+              <a:shade val="50000"/>
+            </a:schemeClr>
+          </a:lnRef>
+          <a:fillRef idx="1">
+            <a:schemeClr val="accent1"/>
+          </a:fillRef>
+          <a:effectRef idx="0">
+            <a:schemeClr val="accent1"/>
+          </a:effectRef>
+          <a:fontRef idx="minor">
+            <a:schemeClr val="lt1"/>
+          </a:fontRef>
+        </p:style>
+        <p:txBody>
+          <a:bodyPr rtlCol="0" anchor="ctr"/>
+          <a:lstStyle/>
+          <a:p>
+            <a:pPr algn="ctr"/>
+            <a:endParaRPr lang="en-US">
+              <a:solidFill>
+                <a:srgbClr val="FFF5D7"/>
+              </a:solidFill>
+            </a:endParaRPr>
+          </a:p>
+        </p:txBody>
+      </p:sp>
+      <p:sp>
+        <p:nvSpPr>
+          <p:cNvPr id="225" name="Rounded Rectangle 224">
+            <a:extLst>
+              <a:ext uri="{FF2B5EF4-FFF2-40B4-BE49-F238E27FC236}">
+                <a16:creationId xmlns:a16="http://schemas.microsoft.com/office/drawing/2014/main" id="{F614A1E2-07E5-861A-22FF-2512F878311B}"/>
+              </a:ext>
+            </a:extLst>
+          </p:cNvPr>
+          <p:cNvSpPr/>
+          <p:nvPr/>
+        </p:nvSpPr>
+        <p:spPr>
+          <a:xfrm>
+            <a:off x="9106116" y="886644"/>
+            <a:ext cx="466182" cy="1247852"/>
+          </a:xfrm>
+          <a:prstGeom prst="roundRect">
+            <a:avLst/>
+          </a:prstGeom>
+          <a:solidFill>
+            <a:srgbClr val="EEFCE9"/>
+          </a:solidFill>
+          <a:ln>
+            <a:solidFill>
+              <a:schemeClr val="tx1"/>
+            </a:solidFill>
+            <a:prstDash val="solid"/>
+          </a:ln>
+        </p:spPr>
+        <p:style>
+          <a:lnRef idx="2">
+            <a:schemeClr val="accent1">
+              <a:shade val="50000"/>
+            </a:schemeClr>
+          </a:lnRef>
+          <a:fillRef idx="1">
+            <a:schemeClr val="accent1"/>
+          </a:fillRef>
+          <a:effectRef idx="0">
+            <a:schemeClr val="accent1"/>
+          </a:effectRef>
+          <a:fontRef idx="minor">
+            <a:schemeClr val="lt1"/>
+          </a:fontRef>
+        </p:style>
+        <p:txBody>
+          <a:bodyPr rtlCol="0" anchor="ctr"/>
+          <a:lstStyle/>
+          <a:p>
+            <a:pPr algn="ctr"/>
+            <a:endParaRPr lang="en-US">
+              <a:solidFill>
+                <a:srgbClr val="FFF5D7"/>
+              </a:solidFill>
+            </a:endParaRPr>
+          </a:p>
+        </p:txBody>
+      </p:sp>
+      <p:sp>
+        <p:nvSpPr>
+          <p:cNvPr id="226" name="Rounded Rectangle 225">
+            <a:extLst>
+              <a:ext uri="{FF2B5EF4-FFF2-40B4-BE49-F238E27FC236}">
+                <a16:creationId xmlns:a16="http://schemas.microsoft.com/office/drawing/2014/main" id="{A43C8266-B5A9-1621-2F16-54C6FE39A84E}"/>
+              </a:ext>
+            </a:extLst>
+          </p:cNvPr>
+          <p:cNvSpPr/>
+          <p:nvPr/>
+        </p:nvSpPr>
+        <p:spPr>
+          <a:xfrm>
+            <a:off x="9066401" y="917951"/>
+            <a:ext cx="466182" cy="1247852"/>
+          </a:xfrm>
+          <a:prstGeom prst="roundRect">
+            <a:avLst/>
+          </a:prstGeom>
+          <a:solidFill>
+            <a:srgbClr val="EEFCE9"/>
+          </a:solidFill>
+          <a:ln>
+            <a:solidFill>
+              <a:schemeClr val="tx1"/>
+            </a:solidFill>
+            <a:prstDash val="solid"/>
+          </a:ln>
+        </p:spPr>
+        <p:style>
+          <a:lnRef idx="2">
+            <a:schemeClr val="accent1">
+              <a:shade val="50000"/>
+            </a:schemeClr>
+          </a:lnRef>
+          <a:fillRef idx="1">
+            <a:schemeClr val="accent1"/>
+          </a:fillRef>
+          <a:effectRef idx="0">
+            <a:schemeClr val="accent1"/>
+          </a:effectRef>
+          <a:fontRef idx="minor">
+            <a:schemeClr val="lt1"/>
+          </a:fontRef>
+        </p:style>
+        <p:txBody>
+          <a:bodyPr rtlCol="0" anchor="ctr"/>
+          <a:lstStyle/>
+          <a:p>
+            <a:pPr algn="ctr"/>
+            <a:endParaRPr lang="en-US">
+              <a:solidFill>
+                <a:srgbClr val="FFF5D7"/>
+              </a:solidFill>
+            </a:endParaRPr>
+          </a:p>
+        </p:txBody>
+      </p:sp>
+      <p:sp>
+        <p:nvSpPr>
+          <p:cNvPr id="227" name="Rounded Rectangle 226">
+            <a:extLst>
+              <a:ext uri="{FF2B5EF4-FFF2-40B4-BE49-F238E27FC236}">
+                <a16:creationId xmlns:a16="http://schemas.microsoft.com/office/drawing/2014/main" id="{4180D4A5-B9C7-F1EE-69E2-DEA802EA5355}"/>
+              </a:ext>
+            </a:extLst>
+          </p:cNvPr>
+          <p:cNvSpPr/>
+          <p:nvPr/>
+        </p:nvSpPr>
+        <p:spPr>
+          <a:xfrm>
+            <a:off x="9023394" y="952002"/>
+            <a:ext cx="466182" cy="1247852"/>
+          </a:xfrm>
+          <a:prstGeom prst="roundRect">
+            <a:avLst/>
+          </a:prstGeom>
+          <a:solidFill>
+            <a:srgbClr val="DAEAD9"/>
+          </a:solidFill>
+          <a:ln>
+            <a:solidFill>
+              <a:schemeClr val="tx1"/>
+            </a:solidFill>
+            <a:prstDash val="solid"/>
+          </a:ln>
+        </p:spPr>
+        <p:style>
+          <a:lnRef idx="2">
+            <a:schemeClr val="accent1">
+              <a:shade val="50000"/>
+            </a:schemeClr>
+          </a:lnRef>
+          <a:fillRef idx="1">
+            <a:schemeClr val="accent1"/>
+          </a:fillRef>
+          <a:effectRef idx="0">
+            <a:schemeClr val="accent1"/>
+          </a:effectRef>
+          <a:fontRef idx="minor">
+            <a:schemeClr val="lt1"/>
+          </a:fontRef>
+        </p:style>
+        <p:txBody>
+          <a:bodyPr rtlCol="0" anchor="ctr"/>
+          <a:lstStyle/>
+          <a:p>
+            <a:pPr algn="ctr"/>
+            <a:endParaRPr lang="en-US">
+              <a:solidFill>
+                <a:srgbClr val="FFF5D7"/>
+              </a:solidFill>
+            </a:endParaRPr>
+          </a:p>
+        </p:txBody>
+      </p:sp>
+      <p:sp>
+        <p:nvSpPr>
+          <p:cNvPr id="228" name="TextBox 227">
+            <a:extLst>
+              <a:ext uri="{FF2B5EF4-FFF2-40B4-BE49-F238E27FC236}">
+                <a16:creationId xmlns:a16="http://schemas.microsoft.com/office/drawing/2014/main" id="{BF32D085-89D0-C181-C83E-8A95D35250AD}"/>
+              </a:ext>
+            </a:extLst>
+          </p:cNvPr>
+          <p:cNvSpPr txBox="1"/>
+          <p:nvPr/>
+        </p:nvSpPr>
+        <p:spPr>
+          <a:xfrm>
+            <a:off x="8979925" y="1216884"/>
+            <a:ext cx="557346" cy="677686"/>
+          </a:xfrm>
+          <a:prstGeom prst="rect">
+            <a:avLst/>
+          </a:prstGeom>
+          <a:noFill/>
+        </p:spPr>
+        <p:txBody>
+          <a:bodyPr wrap="square" rtlCol="0">
+            <a:spAutoFit/>
+          </a:bodyPr>
+          <a:lstStyle/>
+          <a:p>
+            <a:pPr algn="ctr"/>
+            <a:r>
+              <a:rPr lang="en-US" sz="1268" dirty="0"/>
+              <a:t>Gene</a:t>
+            </a:r>
+          </a:p>
+          <a:p>
+            <a:pPr algn="ctr"/>
+            <a:r>
+              <a:rPr lang="en-US" sz="1268" dirty="0"/>
+              <a:t>And </a:t>
+            </a:r>
+          </a:p>
+          <a:p>
+            <a:pPr algn="ctr"/>
+            <a:r>
+              <a:rPr lang="en-US" sz="1268" dirty="0"/>
+              <a:t>TSS</a:t>
+            </a:r>
+          </a:p>
+        </p:txBody>
+      </p:sp>
+      <p:sp>
+        <p:nvSpPr>
+          <p:cNvPr id="20" name="Right Brace 19">
+            <a:extLst>
+              <a:ext uri="{FF2B5EF4-FFF2-40B4-BE49-F238E27FC236}">
+                <a16:creationId xmlns:a16="http://schemas.microsoft.com/office/drawing/2014/main" id="{B9E32B87-F989-F3E7-B646-C1F999B66D36}"/>
+              </a:ext>
+            </a:extLst>
+          </p:cNvPr>
+          <p:cNvSpPr/>
+          <p:nvPr/>
+        </p:nvSpPr>
+        <p:spPr>
+          <a:xfrm rot="16200000">
+            <a:off x="8414522" y="-353679"/>
+            <a:ext cx="235071" cy="2239500"/>
+          </a:xfrm>
+          <a:prstGeom prst="rightBrace">
+            <a:avLst>
+              <a:gd name="adj1" fmla="val 45467"/>
+              <a:gd name="adj2" fmla="val 50000"/>
+            </a:avLst>
+          </a:prstGeom>
+          <a:ln w="12700">
+            <a:solidFill>
+              <a:schemeClr val="tx1"/>
+            </a:solidFill>
+          </a:ln>
+        </p:spPr>
+        <p:style>
+          <a:lnRef idx="1">
+            <a:schemeClr val="accent1"/>
+          </a:lnRef>
+          <a:fillRef idx="0">
+            <a:schemeClr val="accent1"/>
+          </a:fillRef>
+          <a:effectRef idx="0">
+            <a:schemeClr val="accent1"/>
+          </a:effectRef>
+          <a:fontRef idx="minor">
+            <a:schemeClr val="tx1"/>
+          </a:fontRef>
+        </p:style>
+        <p:txBody>
+          <a:bodyPr rtlCol="0" anchor="ctr"/>
+          <a:lstStyle/>
+          <a:p>
+            <a:pPr algn="ctr"/>
+            <a:endParaRPr lang="en-US"/>
+          </a:p>
+        </p:txBody>
+      </p:sp>
+      <p:sp>
+        <p:nvSpPr>
+          <p:cNvPr id="236" name="TextBox 235">
+            <a:extLst>
+              <a:ext uri="{FF2B5EF4-FFF2-40B4-BE49-F238E27FC236}">
+                <a16:creationId xmlns:a16="http://schemas.microsoft.com/office/drawing/2014/main" id="{14F4CA57-EEE9-6316-7671-4FB85CCF741C}"/>
+              </a:ext>
+            </a:extLst>
+          </p:cNvPr>
+          <p:cNvSpPr txBox="1"/>
+          <p:nvPr/>
+        </p:nvSpPr>
+        <p:spPr>
+          <a:xfrm>
+            <a:off x="7462064" y="409715"/>
+            <a:ext cx="2138319" cy="246221"/>
+          </a:xfrm>
+          <a:prstGeom prst="rect">
+            <a:avLst/>
+          </a:prstGeom>
+          <a:noFill/>
+        </p:spPr>
+        <p:txBody>
+          <a:bodyPr wrap="square" rtlCol="0">
+            <a:spAutoFit/>
+          </a:bodyPr>
+          <a:lstStyle/>
+          <a:p>
+            <a:pPr algn="ctr"/>
+            <a:r>
+              <a:rPr lang="en-US" sz="1000" dirty="0">
+                <a:latin typeface="Calibri" panose="020F0502020204030204" pitchFamily="34" charset="0"/>
+                <a:cs typeface="Calibri" panose="020F0502020204030204" pitchFamily="34" charset="0"/>
+              </a:rPr>
+              <a:t>Annotations with one table per gRNA</a:t>
+            </a:r>
+          </a:p>
+        </p:txBody>
+      </p:sp>
+      <p:sp>
+        <p:nvSpPr>
+          <p:cNvPr id="237" name="Right Brace 236">
+            <a:extLst>
+              <a:ext uri="{FF2B5EF4-FFF2-40B4-BE49-F238E27FC236}">
+                <a16:creationId xmlns:a16="http://schemas.microsoft.com/office/drawing/2014/main" id="{858B6D3B-CECD-3095-CB23-1B8EA1280574}"/>
+              </a:ext>
+            </a:extLst>
+          </p:cNvPr>
+          <p:cNvSpPr/>
+          <p:nvPr/>
+        </p:nvSpPr>
+        <p:spPr>
+          <a:xfrm rot="16200000">
+            <a:off x="6203789" y="-277330"/>
+            <a:ext cx="232097" cy="2084566"/>
+          </a:xfrm>
+          <a:prstGeom prst="rightBrace">
+            <a:avLst>
+              <a:gd name="adj1" fmla="val 45467"/>
+              <a:gd name="adj2" fmla="val 50000"/>
+            </a:avLst>
+          </a:prstGeom>
+          <a:ln w="12700">
+            <a:solidFill>
+              <a:schemeClr val="tx1"/>
+            </a:solidFill>
+          </a:ln>
+        </p:spPr>
+        <p:style>
+          <a:lnRef idx="1">
+            <a:schemeClr val="accent1"/>
+          </a:lnRef>
+          <a:fillRef idx="0">
+            <a:schemeClr val="accent1"/>
+          </a:fillRef>
+          <a:effectRef idx="0">
+            <a:schemeClr val="accent1"/>
+          </a:effectRef>
+          <a:fontRef idx="minor">
+            <a:schemeClr val="tx1"/>
+          </a:fontRef>
+        </p:style>
+        <p:txBody>
+          <a:bodyPr rtlCol="0" anchor="ctr"/>
+          <a:lstStyle/>
+          <a:p>
+            <a:pPr algn="ctr"/>
+            <a:endParaRPr lang="en-US"/>
+          </a:p>
+        </p:txBody>
+      </p:sp>
+      <p:sp>
+        <p:nvSpPr>
+          <p:cNvPr id="238" name="TextBox 237">
+            <a:extLst>
+              <a:ext uri="{FF2B5EF4-FFF2-40B4-BE49-F238E27FC236}">
+                <a16:creationId xmlns:a16="http://schemas.microsoft.com/office/drawing/2014/main" id="{0484E92A-C703-3B8A-ABF3-A378AA2586F2}"/>
+              </a:ext>
+            </a:extLst>
+          </p:cNvPr>
+          <p:cNvSpPr txBox="1"/>
+          <p:nvPr/>
+        </p:nvSpPr>
+        <p:spPr>
+          <a:xfrm>
+            <a:off x="5051866" y="409714"/>
+            <a:ext cx="2515055" cy="246221"/>
+          </a:xfrm>
+          <a:prstGeom prst="rect">
+            <a:avLst/>
+          </a:prstGeom>
+          <a:noFill/>
+        </p:spPr>
+        <p:txBody>
+          <a:bodyPr wrap="square" rtlCol="0">
+            <a:spAutoFit/>
+          </a:bodyPr>
+          <a:lstStyle/>
+          <a:p>
+            <a:pPr algn="ctr"/>
+            <a:r>
+              <a:rPr lang="en-US" sz="1000" dirty="0">
+                <a:latin typeface="Calibri" panose="020F0502020204030204" pitchFamily="34" charset="0"/>
+                <a:cs typeface="Calibri" panose="020F0502020204030204" pitchFamily="34" charset="0"/>
+              </a:rPr>
+              <a:t>Annotations with one table across all gRNAs</a:t>
             </a:r>
           </a:p>
         </p:txBody>

</xml_diff>